<commit_message>
add Lab "review" slides
</commit_message>
<xml_diff>
--- a/Week 3/Lecture/Chap-4 -- Multivariate state-space model.pptx
+++ b/Week 3/Lecture/Chap-4 -- Multivariate state-space model.pptx
@@ -21,9 +21,9 @@
     <p:sldId id="329" r:id="rId12"/>
     <p:sldId id="332" r:id="rId13"/>
     <p:sldId id="342" r:id="rId14"/>
-    <p:sldId id="334" r:id="rId15"/>
-    <p:sldId id="335" r:id="rId16"/>
-    <p:sldId id="346" r:id="rId17"/>
+    <p:sldId id="335" r:id="rId15"/>
+    <p:sldId id="346" r:id="rId16"/>
+    <p:sldId id="334" r:id="rId17"/>
     <p:sldId id="333" r:id="rId18"/>
   </p:sldIdLst>
   <p:sldSz cx="9144000" cy="6858000" type="screen4x3"/>
@@ -1015,7 +1015,7 @@
     </p:spTree>
     <p:extLst>
       <p:ext uri="{BB962C8B-B14F-4D97-AF65-F5344CB8AC3E}">
-        <p14:creationId xmlns:p14="http://schemas.microsoft.com/office/powerpoint/2010/main" val="2991899184"/>
+        <p14:creationId xmlns:p14="http://schemas.microsoft.com/office/powerpoint/2010/main" val="2176901699"/>
       </p:ext>
     </p:extLst>
   </p:cSld>
@@ -1124,7 +1124,7 @@
     </p:spTree>
     <p:extLst>
       <p:ext uri="{BB962C8B-B14F-4D97-AF65-F5344CB8AC3E}">
-        <p14:creationId xmlns:p14="http://schemas.microsoft.com/office/powerpoint/2010/main" val="2176901699"/>
+        <p14:creationId xmlns:p14="http://schemas.microsoft.com/office/powerpoint/2010/main" val="67551826"/>
       </p:ext>
     </p:extLst>
   </p:cSld>
@@ -1233,7 +1233,7 @@
     </p:spTree>
     <p:extLst>
       <p:ext uri="{BB962C8B-B14F-4D97-AF65-F5344CB8AC3E}">
-        <p14:creationId xmlns:p14="http://schemas.microsoft.com/office/powerpoint/2010/main" val="67551826"/>
+        <p14:creationId xmlns:p14="http://schemas.microsoft.com/office/powerpoint/2010/main" val="2991899184"/>
       </p:ext>
     </p:extLst>
   </p:cSld>
@@ -6863,6 +6863,1026 @@
           <a:p>
             <a:r>
               <a:rPr lang="en-US" dirty="0"/>
+              <a:t>Community distribution models</a:t>
+            </a:r>
+          </a:p>
+        </p:txBody>
+      </p:sp>
+      <mc:AlternateContent xmlns:mc="http://schemas.openxmlformats.org/markup-compatibility/2006" xmlns:a14="http://schemas.microsoft.com/office/drawing/2010/main">
+        <mc:Choice Requires="a14">
+          <p:sp>
+            <p:nvSpPr>
+              <p:cNvPr id="3" name="Content Placeholder 2"/>
+              <p:cNvSpPr>
+                <a:spLocks noGrp="1"/>
+              </p:cNvSpPr>
+              <p:nvPr>
+                <p:ph idx="1"/>
+              </p:nvPr>
+            </p:nvSpPr>
+            <p:spPr/>
+            <p:txBody>
+              <a:bodyPr>
+                <a:normAutofit lnSpcReduction="10000"/>
+              </a:bodyPr>
+              <a:lstStyle/>
+              <a:p>
+                <a:pPr marL="0" indent="0">
+                  <a:buNone/>
+                </a:pPr>
+                <a:r>
+                  <a:rPr lang="en-US" dirty="0"/>
+                  <a:t>Univariate random variable:</a:t>
+                </a:r>
+              </a:p>
+              <a:p>
+                <a:r>
+                  <a:rPr lang="en-US" dirty="0"/>
+                  <a:t>If</a:t>
+                </a:r>
+              </a:p>
+              <a:p>
+                <a:pPr marL="0" indent="0">
+                  <a:buNone/>
+                </a:pPr>
+                <a14:m>
+                  <m:oMathPara xmlns:m="http://schemas.openxmlformats.org/officeDocument/2006/math">
+                    <m:oMathParaPr>
+                      <m:jc m:val="centerGroup"/>
+                    </m:oMathParaPr>
+                    <m:oMath xmlns:m="http://schemas.openxmlformats.org/officeDocument/2006/math">
+                      <m:r>
+                        <m:rPr>
+                          <m:sty m:val="p"/>
+                        </m:rPr>
+                        <a:rPr lang="en-US" b="0" i="0" smtClean="0">
+                          <a:latin typeface="Cambria Math" panose="02040503050406030204" pitchFamily="18" charset="0"/>
+                        </a:rPr>
+                        <m:t>A</m:t>
+                      </m:r>
+                      <m:r>
+                        <a:rPr lang="en-US" b="0" i="1" smtClean="0">
+                          <a:latin typeface="Cambria Math" panose="02040503050406030204" pitchFamily="18" charset="0"/>
+                        </a:rPr>
+                        <m:t>~</m:t>
+                      </m:r>
+                      <m:r>
+                        <a:rPr lang="en-US" b="0" i="1" smtClean="0">
+                          <a:latin typeface="Cambria Math" panose="02040503050406030204" pitchFamily="18" charset="0"/>
+                        </a:rPr>
+                        <m:t>𝑁𝑜𝑟𝑚𝑎𝑙</m:t>
+                      </m:r>
+                      <m:r>
+                        <a:rPr lang="en-US" b="0" i="1" smtClean="0">
+                          <a:latin typeface="Cambria Math" panose="02040503050406030204" pitchFamily="18" charset="0"/>
+                        </a:rPr>
+                        <m:t>(0,</m:t>
+                      </m:r>
+                      <m:sSup>
+                        <m:sSupPr>
+                          <m:ctrlPr>
+                            <a:rPr lang="en-US" b="0" i="1" smtClean="0">
+                              <a:latin typeface="Cambria Math" panose="02040503050406030204" pitchFamily="18" charset="0"/>
+                            </a:rPr>
+                          </m:ctrlPr>
+                        </m:sSupPr>
+                        <m:e>
+                          <m:r>
+                            <a:rPr lang="en-US" b="0" i="1" smtClean="0">
+                              <a:latin typeface="Cambria Math" panose="02040503050406030204" pitchFamily="18" charset="0"/>
+                            </a:rPr>
+                            <m:t>𝜎</m:t>
+                          </m:r>
+                        </m:e>
+                        <m:sup>
+                          <m:r>
+                            <a:rPr lang="en-US" b="0" i="1" smtClean="0">
+                              <a:latin typeface="Cambria Math" panose="02040503050406030204" pitchFamily="18" charset="0"/>
+                            </a:rPr>
+                            <m:t>2</m:t>
+                          </m:r>
+                        </m:sup>
+                      </m:sSup>
+                      <m:r>
+                        <a:rPr lang="en-US" b="0" i="1" smtClean="0">
+                          <a:latin typeface="Cambria Math" panose="02040503050406030204" pitchFamily="18" charset="0"/>
+                        </a:rPr>
+                        <m:t>)</m:t>
+                      </m:r>
+                    </m:oMath>
+                  </m:oMathPara>
+                </a14:m>
+                <a:endParaRPr lang="en-US" dirty="0"/>
+              </a:p>
+              <a:p>
+                <a:r>
+                  <a:rPr lang="en-US" dirty="0"/>
+                  <a:t>Then</a:t>
+                </a:r>
+              </a:p>
+              <a:p>
+                <a:pPr marL="0" indent="0">
+                  <a:buNone/>
+                </a:pPr>
+                <a14:m>
+                  <m:oMathPara xmlns:m="http://schemas.openxmlformats.org/officeDocument/2006/math">
+                    <m:oMathParaPr>
+                      <m:jc m:val="centerGroup"/>
+                    </m:oMathParaPr>
+                    <m:oMath xmlns:m="http://schemas.openxmlformats.org/officeDocument/2006/math">
+                      <m:r>
+                        <m:rPr>
+                          <m:sty m:val="p"/>
+                        </m:rPr>
+                        <a:rPr lang="en-US" b="0" i="0" smtClean="0">
+                          <a:latin typeface="Cambria Math" panose="02040503050406030204" pitchFamily="18" charset="0"/>
+                        </a:rPr>
+                        <m:t>Var</m:t>
+                      </m:r>
+                      <m:d>
+                        <m:dPr>
+                          <m:ctrlPr>
+                            <a:rPr lang="en-US" b="0" i="1" smtClean="0">
+                              <a:latin typeface="Cambria Math" panose="02040503050406030204" pitchFamily="18" charset="0"/>
+                            </a:rPr>
+                          </m:ctrlPr>
+                        </m:dPr>
+                        <m:e>
+                          <m:r>
+                            <a:rPr lang="en-US" b="0" i="1" smtClean="0">
+                              <a:latin typeface="Cambria Math" panose="02040503050406030204" pitchFamily="18" charset="0"/>
+                            </a:rPr>
+                            <m:t>𝑐</m:t>
+                          </m:r>
+                          <m:r>
+                            <m:rPr>
+                              <m:sty m:val="p"/>
+                            </m:rPr>
+                            <a:rPr lang="en-US" b="0" i="0" smtClean="0">
+                              <a:latin typeface="Cambria Math" panose="02040503050406030204" pitchFamily="18" charset="0"/>
+                            </a:rPr>
+                            <m:t>A</m:t>
+                          </m:r>
+                        </m:e>
+                      </m:d>
+                      <m:r>
+                        <a:rPr lang="en-US" b="0" i="1" smtClean="0">
+                          <a:latin typeface="Cambria Math" panose="02040503050406030204" pitchFamily="18" charset="0"/>
+                        </a:rPr>
+                        <m:t>=</m:t>
+                      </m:r>
+                      <m:sSup>
+                        <m:sSupPr>
+                          <m:ctrlPr>
+                            <a:rPr lang="en-US" b="0" i="1" smtClean="0">
+                              <a:latin typeface="Cambria Math" panose="02040503050406030204" pitchFamily="18" charset="0"/>
+                            </a:rPr>
+                          </m:ctrlPr>
+                        </m:sSupPr>
+                        <m:e>
+                          <m:r>
+                            <a:rPr lang="en-US" b="0" i="1" smtClean="0">
+                              <a:latin typeface="Cambria Math" panose="02040503050406030204" pitchFamily="18" charset="0"/>
+                            </a:rPr>
+                            <m:t>𝑐</m:t>
+                          </m:r>
+                        </m:e>
+                        <m:sup>
+                          <m:r>
+                            <a:rPr lang="en-US" b="0" i="1" smtClean="0">
+                              <a:latin typeface="Cambria Math" panose="02040503050406030204" pitchFamily="18" charset="0"/>
+                            </a:rPr>
+                            <m:t>2</m:t>
+                          </m:r>
+                        </m:sup>
+                      </m:sSup>
+                      <m:sSup>
+                        <m:sSupPr>
+                          <m:ctrlPr>
+                            <a:rPr lang="en-US" b="0" i="1" smtClean="0">
+                              <a:latin typeface="Cambria Math" panose="02040503050406030204" pitchFamily="18" charset="0"/>
+                            </a:rPr>
+                          </m:ctrlPr>
+                        </m:sSupPr>
+                        <m:e>
+                          <m:r>
+                            <a:rPr lang="en-US" b="0" i="1" smtClean="0">
+                              <a:latin typeface="Cambria Math" panose="02040503050406030204" pitchFamily="18" charset="0"/>
+                            </a:rPr>
+                            <m:t>𝜎</m:t>
+                          </m:r>
+                        </m:e>
+                        <m:sup>
+                          <m:r>
+                            <a:rPr lang="en-US" b="0" i="1" smtClean="0">
+                              <a:latin typeface="Cambria Math" panose="02040503050406030204" pitchFamily="18" charset="0"/>
+                            </a:rPr>
+                            <m:t>2</m:t>
+                          </m:r>
+                        </m:sup>
+                      </m:sSup>
+                    </m:oMath>
+                  </m:oMathPara>
+                </a14:m>
+                <a:endParaRPr lang="en-US" dirty="0"/>
+              </a:p>
+              <a:p>
+                <a:pPr marL="0" indent="0">
+                  <a:buNone/>
+                </a:pPr>
+                <a:endParaRPr lang="en-US" dirty="0"/>
+              </a:p>
+              <a:p>
+                <a:pPr marL="0" indent="0">
+                  <a:buNone/>
+                </a:pPr>
+                <a:r>
+                  <a:rPr lang="en-US" dirty="0"/>
+                  <a:t>Multivariate random variable</a:t>
+                </a:r>
+              </a:p>
+              <a:p>
+                <a:r>
+                  <a:rPr lang="en-US" dirty="0"/>
+                  <a:t>If </a:t>
+                </a:r>
+              </a:p>
+              <a:p>
+                <a:pPr marL="0" indent="0">
+                  <a:buNone/>
+                </a:pPr>
+                <a14:m>
+                  <m:oMathPara xmlns:m="http://schemas.openxmlformats.org/officeDocument/2006/math">
+                    <m:oMathParaPr>
+                      <m:jc m:val="centerGroup"/>
+                    </m:oMathParaPr>
+                    <m:oMath xmlns:m="http://schemas.openxmlformats.org/officeDocument/2006/math">
+                      <m:r>
+                        <a:rPr lang="en-US" b="1">
+                          <a:latin typeface="Cambria Math" panose="02040503050406030204" pitchFamily="18" charset="0"/>
+                          <a:ea typeface="Cambria Math" panose="02040503050406030204" pitchFamily="18" charset="0"/>
+                        </a:rPr>
+                        <m:t>𝛆</m:t>
+                      </m:r>
+                      <m:r>
+                        <a:rPr lang="en-US" i="1">
+                          <a:latin typeface="Cambria Math" panose="02040503050406030204" pitchFamily="18" charset="0"/>
+                          <a:ea typeface="Cambria Math" panose="02040503050406030204" pitchFamily="18" charset="0"/>
+                        </a:rPr>
+                        <m:t>~</m:t>
+                      </m:r>
+                      <m:r>
+                        <a:rPr lang="en-US" i="1">
+                          <a:latin typeface="Cambria Math" panose="02040503050406030204" pitchFamily="18" charset="0"/>
+                          <a:ea typeface="Cambria Math" panose="02040503050406030204" pitchFamily="18" charset="0"/>
+                        </a:rPr>
+                        <m:t>𝑀𝑉𝑁</m:t>
+                      </m:r>
+                      <m:r>
+                        <a:rPr lang="en-US" i="1">
+                          <a:latin typeface="Cambria Math" panose="02040503050406030204" pitchFamily="18" charset="0"/>
+                          <a:ea typeface="Cambria Math" panose="02040503050406030204" pitchFamily="18" charset="0"/>
+                        </a:rPr>
+                        <m:t>(</m:t>
+                      </m:r>
+                      <m:r>
+                        <a:rPr lang="en-US" b="1" i="1">
+                          <a:latin typeface="Cambria Math" panose="02040503050406030204" pitchFamily="18" charset="0"/>
+                          <a:ea typeface="Cambria Math" panose="02040503050406030204" pitchFamily="18" charset="0"/>
+                        </a:rPr>
+                        <m:t>𝟎</m:t>
+                      </m:r>
+                      <m:r>
+                        <a:rPr lang="en-US" i="1">
+                          <a:latin typeface="Cambria Math" panose="02040503050406030204" pitchFamily="18" charset="0"/>
+                          <a:ea typeface="Cambria Math" panose="02040503050406030204" pitchFamily="18" charset="0"/>
+                        </a:rPr>
+                        <m:t>,</m:t>
+                      </m:r>
+                      <m:r>
+                        <a:rPr lang="el-GR" b="1">
+                          <a:latin typeface="Cambria Math" panose="02040503050406030204" pitchFamily="18" charset="0"/>
+                          <a:ea typeface="Cambria Math" panose="02040503050406030204" pitchFamily="18" charset="0"/>
+                        </a:rPr>
+                        <m:t>𝚺</m:t>
+                      </m:r>
+                      <m:r>
+                        <a:rPr lang="en-US" b="1">
+                          <a:latin typeface="Cambria Math" panose="02040503050406030204" pitchFamily="18" charset="0"/>
+                          <a:ea typeface="Cambria Math" panose="02040503050406030204" pitchFamily="18" charset="0"/>
+                        </a:rPr>
+                        <m:t>)</m:t>
+                      </m:r>
+                    </m:oMath>
+                  </m:oMathPara>
+                </a14:m>
+                <a:endParaRPr lang="en-US" dirty="0"/>
+              </a:p>
+              <a:p>
+                <a:r>
+                  <a:rPr lang="en-US" dirty="0"/>
+                  <a:t>Then</a:t>
+                </a:r>
+              </a:p>
+              <a:p>
+                <a:pPr marL="0" indent="0">
+                  <a:buNone/>
+                </a:pPr>
+                <a14:m>
+                  <m:oMathPara xmlns:m="http://schemas.openxmlformats.org/officeDocument/2006/math">
+                    <m:oMathParaPr>
+                      <m:jc m:val="centerGroup"/>
+                    </m:oMathParaPr>
+                    <m:oMath xmlns:m="http://schemas.openxmlformats.org/officeDocument/2006/math">
+                      <m:r>
+                        <m:rPr>
+                          <m:sty m:val="p"/>
+                        </m:rPr>
+                        <a:rPr lang="en-US" b="0" i="0" smtClean="0">
+                          <a:latin typeface="Cambria Math" panose="02040503050406030204" pitchFamily="18" charset="0"/>
+                        </a:rPr>
+                        <m:t>Var</m:t>
+                      </m:r>
+                      <m:d>
+                        <m:dPr>
+                          <m:ctrlPr>
+                            <a:rPr lang="en-US" b="0" i="1" smtClean="0">
+                              <a:latin typeface="Cambria Math" panose="02040503050406030204" pitchFamily="18" charset="0"/>
+                            </a:rPr>
+                          </m:ctrlPr>
+                        </m:dPr>
+                        <m:e>
+                          <m:r>
+                            <a:rPr lang="en-US" b="1" i="0" smtClean="0">
+                              <a:latin typeface="Cambria Math" panose="02040503050406030204" pitchFamily="18" charset="0"/>
+                            </a:rPr>
+                            <m:t>𝐋</m:t>
+                          </m:r>
+                          <m:r>
+                            <a:rPr lang="en-US" b="1" i="0" smtClean="0">
+                              <a:latin typeface="Cambria Math" panose="02040503050406030204" pitchFamily="18" charset="0"/>
+                            </a:rPr>
+                            <m:t>𝛜</m:t>
+                          </m:r>
+                        </m:e>
+                      </m:d>
+                      <m:r>
+                        <a:rPr lang="en-US" b="0" i="1" smtClean="0">
+                          <a:latin typeface="Cambria Math" panose="02040503050406030204" pitchFamily="18" charset="0"/>
+                        </a:rPr>
+                        <m:t>=</m:t>
+                      </m:r>
+                      <m:r>
+                        <a:rPr lang="en-US" b="1">
+                          <a:latin typeface="Cambria Math" panose="02040503050406030204" pitchFamily="18" charset="0"/>
+                        </a:rPr>
+                        <m:t>𝐋</m:t>
+                      </m:r>
+                      <m:r>
+                        <a:rPr lang="el-GR" b="1">
+                          <a:latin typeface="Cambria Math" panose="02040503050406030204" pitchFamily="18" charset="0"/>
+                          <a:ea typeface="Cambria Math" panose="02040503050406030204" pitchFamily="18" charset="0"/>
+                        </a:rPr>
+                        <m:t>𝚺</m:t>
+                      </m:r>
+                      <m:sSup>
+                        <m:sSupPr>
+                          <m:ctrlPr>
+                            <a:rPr lang="en-US" b="1" i="1" smtClean="0">
+                              <a:latin typeface="Cambria Math" panose="02040503050406030204" pitchFamily="18" charset="0"/>
+                              <a:ea typeface="Cambria Math" panose="02040503050406030204" pitchFamily="18" charset="0"/>
+                            </a:rPr>
+                          </m:ctrlPr>
+                        </m:sSupPr>
+                        <m:e>
+                          <m:r>
+                            <a:rPr lang="en-US" b="1">
+                              <a:latin typeface="Cambria Math" panose="02040503050406030204" pitchFamily="18" charset="0"/>
+                            </a:rPr>
+                            <m:t>𝐋</m:t>
+                          </m:r>
+                        </m:e>
+                        <m:sup>
+                          <m:r>
+                            <a:rPr lang="en-US" b="0" i="1" smtClean="0">
+                              <a:latin typeface="Cambria Math" panose="02040503050406030204" pitchFamily="18" charset="0"/>
+                            </a:rPr>
+                            <m:t>𝑡</m:t>
+                          </m:r>
+                        </m:sup>
+                      </m:sSup>
+                    </m:oMath>
+                  </m:oMathPara>
+                </a14:m>
+                <a:endParaRPr lang="en-US" dirty="0"/>
+              </a:p>
+              <a:p>
+                <a:pPr marL="0" indent="0">
+                  <a:buNone/>
+                </a:pPr>
+                <a:endParaRPr lang="en-US" dirty="0"/>
+              </a:p>
+              <a:p>
+                <a:pPr marL="0" indent="0">
+                  <a:buNone/>
+                </a:pPr>
+                <a:endParaRPr lang="en-US" dirty="0"/>
+              </a:p>
+            </p:txBody>
+          </p:sp>
+        </mc:Choice>
+        <mc:Fallback xmlns="">
+          <p:sp>
+            <p:nvSpPr>
+              <p:cNvPr id="3" name="Content Placeholder 2"/>
+              <p:cNvSpPr>
+                <a:spLocks noGrp="1" noRot="1" noChangeAspect="1" noMove="1" noResize="1" noEditPoints="1" noAdjustHandles="1" noChangeArrowheads="1" noChangeShapeType="1" noTextEdit="1"/>
+              </p:cNvSpPr>
+              <p:nvPr>
+                <p:ph idx="1"/>
+              </p:nvPr>
+            </p:nvSpPr>
+            <p:spPr>
+              <a:blipFill>
+                <a:blip r:embed="rId3"/>
+                <a:stretch>
+                  <a:fillRect l="-1424" t="-1744"/>
+                </a:stretch>
+              </a:blipFill>
+            </p:spPr>
+            <p:txBody>
+              <a:bodyPr/>
+              <a:lstStyle/>
+              <a:p>
+                <a:r>
+                  <a:rPr lang="en-US">
+                    <a:noFill/>
+                  </a:rPr>
+                  <a:t> </a:t>
+                </a:r>
+              </a:p>
+            </p:txBody>
+          </p:sp>
+        </mc:Fallback>
+      </mc:AlternateContent>
+    </p:spTree>
+    <p:extLst>
+      <p:ext uri="{BB962C8B-B14F-4D97-AF65-F5344CB8AC3E}">
+        <p14:creationId xmlns:p14="http://schemas.microsoft.com/office/powerpoint/2010/main" val="360273833"/>
+      </p:ext>
+    </p:extLst>
+  </p:cSld>
+  <p:clrMapOvr>
+    <a:masterClrMapping/>
+  </p:clrMapOvr>
+</p:sld>
+</file>
+
+<file path=ppt/slides/slide15.xml><?xml version="1.0" encoding="utf-8"?>
+<p:sld xmlns:a="http://schemas.openxmlformats.org/drawingml/2006/main" xmlns:r="http://schemas.openxmlformats.org/officeDocument/2006/relationships" xmlns:p="http://schemas.openxmlformats.org/presentationml/2006/main">
+  <p:cSld>
+    <p:spTree>
+      <p:nvGrpSpPr>
+        <p:cNvPr id="1" name=""/>
+        <p:cNvGrpSpPr/>
+        <p:nvPr/>
+      </p:nvGrpSpPr>
+      <p:grpSpPr>
+        <a:xfrm>
+          <a:off x="0" y="0"/>
+          <a:ext cx="0" cy="0"/>
+          <a:chOff x="0" y="0"/>
+          <a:chExt cx="0" cy="0"/>
+        </a:xfrm>
+      </p:grpSpPr>
+      <p:sp>
+        <p:nvSpPr>
+          <p:cNvPr id="2" name="Title 1"/>
+          <p:cNvSpPr>
+            <a:spLocks noGrp="1"/>
+          </p:cNvSpPr>
+          <p:nvPr>
+            <p:ph type="title"/>
+          </p:nvPr>
+        </p:nvSpPr>
+        <p:spPr/>
+        <p:txBody>
+          <a:bodyPr/>
+          <a:lstStyle/>
+          <a:p>
+            <a:r>
+              <a:rPr lang="en-US" dirty="0"/>
+              <a:t>Community distribution models</a:t>
+            </a:r>
+          </a:p>
+        </p:txBody>
+      </p:sp>
+      <mc:AlternateContent xmlns:mc="http://schemas.openxmlformats.org/markup-compatibility/2006" xmlns:a14="http://schemas.microsoft.com/office/drawing/2010/main">
+        <mc:Choice Requires="a14">
+          <p:sp>
+            <p:nvSpPr>
+              <p:cNvPr id="3" name="Content Placeholder 2"/>
+              <p:cNvSpPr>
+                <a:spLocks noGrp="1"/>
+              </p:cNvSpPr>
+              <p:nvPr>
+                <p:ph idx="1"/>
+              </p:nvPr>
+            </p:nvSpPr>
+            <p:spPr/>
+            <p:txBody>
+              <a:bodyPr>
+                <a:normAutofit fontScale="92500" lnSpcReduction="20000"/>
+              </a:bodyPr>
+              <a:lstStyle/>
+              <a:p>
+                <a:pPr marL="0" indent="0">
+                  <a:buNone/>
+                </a:pPr>
+                <a:r>
+                  <a:rPr lang="en-US" dirty="0"/>
+                  <a:t>Multivariate random variable</a:t>
+                </a:r>
+              </a:p>
+              <a:p>
+                <a:r>
+                  <a:rPr lang="en-US" dirty="0"/>
+                  <a:t>If (simplifying previous version)</a:t>
+                </a:r>
+              </a:p>
+              <a:p>
+                <a:pPr marL="0" indent="0">
+                  <a:buNone/>
+                </a:pPr>
+                <a14:m>
+                  <m:oMathPara xmlns:m="http://schemas.openxmlformats.org/officeDocument/2006/math">
+                    <m:oMathParaPr>
+                      <m:jc m:val="centerGroup"/>
+                    </m:oMathParaPr>
+                    <m:oMath xmlns:m="http://schemas.openxmlformats.org/officeDocument/2006/math">
+                      <m:r>
+                        <a:rPr lang="en-US" b="1">
+                          <a:latin typeface="Cambria Math" panose="02040503050406030204" pitchFamily="18" charset="0"/>
+                          <a:ea typeface="Cambria Math" panose="02040503050406030204" pitchFamily="18" charset="0"/>
+                        </a:rPr>
+                        <m:t>𝛆</m:t>
+                      </m:r>
+                      <m:r>
+                        <a:rPr lang="en-US" i="1">
+                          <a:latin typeface="Cambria Math" panose="02040503050406030204" pitchFamily="18" charset="0"/>
+                          <a:ea typeface="Cambria Math" panose="02040503050406030204" pitchFamily="18" charset="0"/>
+                        </a:rPr>
+                        <m:t>~</m:t>
+                      </m:r>
+                      <m:r>
+                        <a:rPr lang="en-US" i="1">
+                          <a:latin typeface="Cambria Math" panose="02040503050406030204" pitchFamily="18" charset="0"/>
+                          <a:ea typeface="Cambria Math" panose="02040503050406030204" pitchFamily="18" charset="0"/>
+                        </a:rPr>
+                        <m:t>𝑀𝑉𝑁</m:t>
+                      </m:r>
+                      <m:r>
+                        <a:rPr lang="en-US" i="1">
+                          <a:latin typeface="Cambria Math" panose="02040503050406030204" pitchFamily="18" charset="0"/>
+                          <a:ea typeface="Cambria Math" panose="02040503050406030204" pitchFamily="18" charset="0"/>
+                        </a:rPr>
+                        <m:t>(</m:t>
+                      </m:r>
+                      <m:r>
+                        <a:rPr lang="en-US" b="1" i="1">
+                          <a:latin typeface="Cambria Math" panose="02040503050406030204" pitchFamily="18" charset="0"/>
+                          <a:ea typeface="Cambria Math" panose="02040503050406030204" pitchFamily="18" charset="0"/>
+                        </a:rPr>
+                        <m:t>𝟎</m:t>
+                      </m:r>
+                      <m:r>
+                        <a:rPr lang="en-US" i="1">
+                          <a:latin typeface="Cambria Math" panose="02040503050406030204" pitchFamily="18" charset="0"/>
+                          <a:ea typeface="Cambria Math" panose="02040503050406030204" pitchFamily="18" charset="0"/>
+                        </a:rPr>
+                        <m:t>,</m:t>
+                      </m:r>
+                      <m:r>
+                        <a:rPr lang="en-US" b="1" i="0" smtClean="0">
+                          <a:latin typeface="Cambria Math" panose="02040503050406030204" pitchFamily="18" charset="0"/>
+                          <a:ea typeface="Cambria Math" panose="02040503050406030204" pitchFamily="18" charset="0"/>
+                        </a:rPr>
+                        <m:t>𝐈</m:t>
+                      </m:r>
+                      <m:r>
+                        <a:rPr lang="en-US" b="1">
+                          <a:latin typeface="Cambria Math" panose="02040503050406030204" pitchFamily="18" charset="0"/>
+                          <a:ea typeface="Cambria Math" panose="02040503050406030204" pitchFamily="18" charset="0"/>
+                        </a:rPr>
+                        <m:t>)</m:t>
+                      </m:r>
+                    </m:oMath>
+                  </m:oMathPara>
+                </a14:m>
+                <a:endParaRPr lang="en-US" dirty="0"/>
+              </a:p>
+              <a:p>
+                <a:r>
+                  <a:rPr lang="en-US" dirty="0"/>
+                  <a:t>Then</a:t>
+                </a:r>
+              </a:p>
+              <a:p>
+                <a:pPr marL="0" indent="0">
+                  <a:buNone/>
+                </a:pPr>
+                <a14:m>
+                  <m:oMathPara xmlns:m="http://schemas.openxmlformats.org/officeDocument/2006/math">
+                    <m:oMathParaPr>
+                      <m:jc m:val="centerGroup"/>
+                    </m:oMathParaPr>
+                    <m:oMath xmlns:m="http://schemas.openxmlformats.org/officeDocument/2006/math">
+                      <m:r>
+                        <m:rPr>
+                          <m:sty m:val="p"/>
+                        </m:rPr>
+                        <a:rPr lang="en-US" b="0" i="0" smtClean="0">
+                          <a:latin typeface="Cambria Math" panose="02040503050406030204" pitchFamily="18" charset="0"/>
+                        </a:rPr>
+                        <m:t>Var</m:t>
+                      </m:r>
+                      <m:d>
+                        <m:dPr>
+                          <m:ctrlPr>
+                            <a:rPr lang="en-US" b="0" i="1" smtClean="0">
+                              <a:latin typeface="Cambria Math" panose="02040503050406030204" pitchFamily="18" charset="0"/>
+                            </a:rPr>
+                          </m:ctrlPr>
+                        </m:dPr>
+                        <m:e>
+                          <m:r>
+                            <a:rPr lang="en-US" b="1" i="0" smtClean="0">
+                              <a:latin typeface="Cambria Math" panose="02040503050406030204" pitchFamily="18" charset="0"/>
+                            </a:rPr>
+                            <m:t>𝐋</m:t>
+                          </m:r>
+                          <m:r>
+                            <a:rPr lang="en-US" b="1" i="0" smtClean="0">
+                              <a:latin typeface="Cambria Math" panose="02040503050406030204" pitchFamily="18" charset="0"/>
+                            </a:rPr>
+                            <m:t>𝛜</m:t>
+                          </m:r>
+                        </m:e>
+                      </m:d>
+                      <m:r>
+                        <a:rPr lang="en-US" b="0" i="1" smtClean="0">
+                          <a:latin typeface="Cambria Math" panose="02040503050406030204" pitchFamily="18" charset="0"/>
+                        </a:rPr>
+                        <m:t>=</m:t>
+                      </m:r>
+                      <m:r>
+                        <a:rPr lang="en-US" b="1">
+                          <a:latin typeface="Cambria Math" panose="02040503050406030204" pitchFamily="18" charset="0"/>
+                        </a:rPr>
+                        <m:t>𝐋</m:t>
+                      </m:r>
+                      <m:sSup>
+                        <m:sSupPr>
+                          <m:ctrlPr>
+                            <a:rPr lang="en-US" b="1" i="1" smtClean="0">
+                              <a:latin typeface="Cambria Math" panose="02040503050406030204" pitchFamily="18" charset="0"/>
+                              <a:ea typeface="Cambria Math" panose="02040503050406030204" pitchFamily="18" charset="0"/>
+                            </a:rPr>
+                          </m:ctrlPr>
+                        </m:sSupPr>
+                        <m:e>
+                          <m:r>
+                            <a:rPr lang="en-US" b="1">
+                              <a:latin typeface="Cambria Math" panose="02040503050406030204" pitchFamily="18" charset="0"/>
+                            </a:rPr>
+                            <m:t>𝐋</m:t>
+                          </m:r>
+                        </m:e>
+                        <m:sup>
+                          <m:r>
+                            <a:rPr lang="en-US" b="0" i="1" smtClean="0">
+                              <a:latin typeface="Cambria Math" panose="02040503050406030204" pitchFamily="18" charset="0"/>
+                            </a:rPr>
+                            <m:t>𝑡</m:t>
+                          </m:r>
+                        </m:sup>
+                      </m:sSup>
+                    </m:oMath>
+                  </m:oMathPara>
+                </a14:m>
+                <a:endParaRPr lang="en-US" dirty="0"/>
+              </a:p>
+              <a:p>
+                <a:pPr marL="0" indent="0">
+                  <a:buNone/>
+                </a:pPr>
+                <a:endParaRPr lang="en-US" dirty="0"/>
+              </a:p>
+              <a:p>
+                <a:pPr marL="0" indent="0">
+                  <a:buNone/>
+                </a:pPr>
+                <a:r>
+                  <a:rPr lang="en-US" dirty="0"/>
+                  <a:t>So how can we simulate from a random normal distribution?</a:t>
+                </a:r>
+                <a:endParaRPr lang="en-US" b="1" dirty="0"/>
+              </a:p>
+              <a:p>
+                <a:r>
+                  <a:rPr lang="en-US" dirty="0"/>
+                  <a:t>Given </a:t>
+                </a:r>
+                <a:endParaRPr lang="en-US" b="1" i="0" dirty="0">
+                  <a:latin typeface="Cambria Math" panose="02040503050406030204" pitchFamily="18" charset="0"/>
+                  <a:ea typeface="Cambria Math" panose="02040503050406030204" pitchFamily="18" charset="0"/>
+                </a:endParaRPr>
+              </a:p>
+              <a:p>
+                <a:pPr marL="0" indent="0">
+                  <a:buNone/>
+                </a:pPr>
+                <a14:m>
+                  <m:oMathPara xmlns:m="http://schemas.openxmlformats.org/officeDocument/2006/math">
+                    <m:oMathParaPr>
+                      <m:jc m:val="centerGroup"/>
+                    </m:oMathParaPr>
+                    <m:oMath xmlns:m="http://schemas.openxmlformats.org/officeDocument/2006/math">
+                      <m:r>
+                        <a:rPr lang="en-US" b="1" i="0" smtClean="0">
+                          <a:latin typeface="Cambria Math" panose="02040503050406030204" pitchFamily="18" charset="0"/>
+                          <a:ea typeface="Cambria Math" panose="02040503050406030204" pitchFamily="18" charset="0"/>
+                        </a:rPr>
+                        <m:t>𝛆</m:t>
+                      </m:r>
+                      <m:r>
+                        <a:rPr lang="en-US" b="0" i="1" smtClean="0">
+                          <a:latin typeface="Cambria Math" panose="02040503050406030204" pitchFamily="18" charset="0"/>
+                          <a:ea typeface="Cambria Math" panose="02040503050406030204" pitchFamily="18" charset="0"/>
+                        </a:rPr>
+                        <m:t>~</m:t>
+                      </m:r>
+                      <m:r>
+                        <a:rPr lang="en-US" b="0" i="1" smtClean="0">
+                          <a:latin typeface="Cambria Math" panose="02040503050406030204" pitchFamily="18" charset="0"/>
+                          <a:ea typeface="Cambria Math" panose="02040503050406030204" pitchFamily="18" charset="0"/>
+                        </a:rPr>
+                        <m:t>𝑀𝑉𝑁</m:t>
+                      </m:r>
+                      <m:r>
+                        <a:rPr lang="en-US" b="0" i="1" smtClean="0">
+                          <a:latin typeface="Cambria Math" panose="02040503050406030204" pitchFamily="18" charset="0"/>
+                          <a:ea typeface="Cambria Math" panose="02040503050406030204" pitchFamily="18" charset="0"/>
+                        </a:rPr>
+                        <m:t>(</m:t>
+                      </m:r>
+                      <m:r>
+                        <a:rPr lang="en-US" b="1" i="1" smtClean="0">
+                          <a:latin typeface="Cambria Math" panose="02040503050406030204" pitchFamily="18" charset="0"/>
+                          <a:ea typeface="Cambria Math" panose="02040503050406030204" pitchFamily="18" charset="0"/>
+                        </a:rPr>
+                        <m:t>𝟎</m:t>
+                      </m:r>
+                      <m:r>
+                        <a:rPr lang="en-US" b="0" i="1" smtClean="0">
+                          <a:latin typeface="Cambria Math" panose="02040503050406030204" pitchFamily="18" charset="0"/>
+                          <a:ea typeface="Cambria Math" panose="02040503050406030204" pitchFamily="18" charset="0"/>
+                        </a:rPr>
+                        <m:t>,</m:t>
+                      </m:r>
+                      <m:r>
+                        <a:rPr lang="el-GR" b="1">
+                          <a:latin typeface="Cambria Math" panose="02040503050406030204" pitchFamily="18" charset="0"/>
+                          <a:ea typeface="Cambria Math" panose="02040503050406030204" pitchFamily="18" charset="0"/>
+                        </a:rPr>
+                        <m:t>𝚺</m:t>
+                      </m:r>
+                      <m:r>
+                        <a:rPr lang="en-US" b="1" i="0" smtClean="0">
+                          <a:latin typeface="Cambria Math" panose="02040503050406030204" pitchFamily="18" charset="0"/>
+                          <a:ea typeface="Cambria Math" panose="02040503050406030204" pitchFamily="18" charset="0"/>
+                        </a:rPr>
+                        <m:t>)</m:t>
+                      </m:r>
+                    </m:oMath>
+                  </m:oMathPara>
+                </a14:m>
+                <a:endParaRPr lang="en-US" dirty="0"/>
+              </a:p>
+              <a:p>
+                <a:pPr lvl="1"/>
+                <a:r>
+                  <a:rPr lang="en-US" dirty="0"/>
+                  <a:t>Then doing some math</a:t>
+                </a:r>
+              </a:p>
+              <a:p>
+                <a:pPr marL="457200" lvl="1" indent="0">
+                  <a:buNone/>
+                </a:pPr>
+                <a14:m>
+                  <m:oMathPara xmlns:m="http://schemas.openxmlformats.org/officeDocument/2006/math">
+                    <m:oMathParaPr>
+                      <m:jc m:val="centerGroup"/>
+                    </m:oMathParaPr>
+                    <m:oMath xmlns:m="http://schemas.openxmlformats.org/officeDocument/2006/math">
+                      <m:r>
+                        <a:rPr lang="en-US" b="1" i="0" smtClean="0">
+                          <a:latin typeface="Cambria Math" panose="02040503050406030204" pitchFamily="18" charset="0"/>
+                          <a:ea typeface="Cambria Math" panose="02040503050406030204" pitchFamily="18" charset="0"/>
+                        </a:rPr>
+                        <m:t>𝛅</m:t>
+                      </m:r>
+                      <m:r>
+                        <a:rPr lang="en-US" i="1">
+                          <a:latin typeface="Cambria Math" panose="02040503050406030204" pitchFamily="18" charset="0"/>
+                          <a:ea typeface="Cambria Math" panose="02040503050406030204" pitchFamily="18" charset="0"/>
+                        </a:rPr>
+                        <m:t>~</m:t>
+                      </m:r>
+                      <m:r>
+                        <a:rPr lang="en-US" i="1">
+                          <a:latin typeface="Cambria Math" panose="02040503050406030204" pitchFamily="18" charset="0"/>
+                          <a:ea typeface="Cambria Math" panose="02040503050406030204" pitchFamily="18" charset="0"/>
+                        </a:rPr>
+                        <m:t>𝑀𝑉𝑁</m:t>
+                      </m:r>
+                      <m:r>
+                        <a:rPr lang="en-US" i="1">
+                          <a:latin typeface="Cambria Math" panose="02040503050406030204" pitchFamily="18" charset="0"/>
+                          <a:ea typeface="Cambria Math" panose="02040503050406030204" pitchFamily="18" charset="0"/>
+                        </a:rPr>
+                        <m:t>(</m:t>
+                      </m:r>
+                      <m:r>
+                        <a:rPr lang="en-US" b="1" i="1">
+                          <a:latin typeface="Cambria Math" panose="02040503050406030204" pitchFamily="18" charset="0"/>
+                          <a:ea typeface="Cambria Math" panose="02040503050406030204" pitchFamily="18" charset="0"/>
+                        </a:rPr>
+                        <m:t>𝟎</m:t>
+                      </m:r>
+                      <m:r>
+                        <a:rPr lang="en-US" i="1">
+                          <a:latin typeface="Cambria Math" panose="02040503050406030204" pitchFamily="18" charset="0"/>
+                          <a:ea typeface="Cambria Math" panose="02040503050406030204" pitchFamily="18" charset="0"/>
+                        </a:rPr>
+                        <m:t>,</m:t>
+                      </m:r>
+                      <m:r>
+                        <a:rPr lang="en-US" b="1" i="0" smtClean="0">
+                          <a:latin typeface="Cambria Math" panose="02040503050406030204" pitchFamily="18" charset="0"/>
+                          <a:ea typeface="Cambria Math" panose="02040503050406030204" pitchFamily="18" charset="0"/>
+                        </a:rPr>
+                        <m:t>𝐈</m:t>
+                      </m:r>
+                      <m:r>
+                        <a:rPr lang="en-US" b="1">
+                          <a:latin typeface="Cambria Math" panose="02040503050406030204" pitchFamily="18" charset="0"/>
+                          <a:ea typeface="Cambria Math" panose="02040503050406030204" pitchFamily="18" charset="0"/>
+                        </a:rPr>
+                        <m:t>)</m:t>
+                      </m:r>
+                    </m:oMath>
+                  </m:oMathPara>
+                </a14:m>
+                <a:endParaRPr lang="en-US" dirty="0"/>
+              </a:p>
+              <a:p>
+                <a:pPr marL="457200" lvl="1" indent="0">
+                  <a:buNone/>
+                </a:pPr>
+                <a14:m>
+                  <m:oMathPara xmlns:m="http://schemas.openxmlformats.org/officeDocument/2006/math">
+                    <m:oMathParaPr>
+                      <m:jc m:val="centerGroup"/>
+                    </m:oMathParaPr>
+                    <m:oMath xmlns:m="http://schemas.openxmlformats.org/officeDocument/2006/math">
+                      <m:r>
+                        <a:rPr lang="en-US" b="1">
+                          <a:latin typeface="Cambria Math" panose="02040503050406030204" pitchFamily="18" charset="0"/>
+                          <a:ea typeface="Cambria Math" panose="02040503050406030204" pitchFamily="18" charset="0"/>
+                        </a:rPr>
+                        <m:t>𝛆</m:t>
+                      </m:r>
+                      <m:r>
+                        <a:rPr lang="en-US" b="1" i="0" smtClean="0">
+                          <a:latin typeface="Cambria Math" panose="02040503050406030204" pitchFamily="18" charset="0"/>
+                          <a:ea typeface="Cambria Math" panose="02040503050406030204" pitchFamily="18" charset="0"/>
+                        </a:rPr>
+                        <m:t>=</m:t>
+                      </m:r>
+                      <m:r>
+                        <a:rPr lang="en-US" b="1" i="0" smtClean="0">
+                          <a:latin typeface="Cambria Math" panose="02040503050406030204" pitchFamily="18" charset="0"/>
+                          <a:ea typeface="Cambria Math" panose="02040503050406030204" pitchFamily="18" charset="0"/>
+                        </a:rPr>
+                        <m:t>𝐋</m:t>
+                      </m:r>
+                      <m:r>
+                        <a:rPr lang="en-US" b="1">
+                          <a:latin typeface="Cambria Math" panose="02040503050406030204" pitchFamily="18" charset="0"/>
+                          <a:ea typeface="Cambria Math" panose="02040503050406030204" pitchFamily="18" charset="0"/>
+                        </a:rPr>
+                        <m:t>𝛅</m:t>
+                      </m:r>
+                    </m:oMath>
+                  </m:oMathPara>
+                </a14:m>
+                <a:endParaRPr lang="en-US" dirty="0"/>
+              </a:p>
+              <a:p>
+                <a:pPr marL="457200" lvl="1" indent="0">
+                  <a:buNone/>
+                </a:pPr>
+                <a:r>
+                  <a:rPr lang="en-US" dirty="0"/>
+                  <a:t>Why does this work?</a:t>
+                </a:r>
+              </a:p>
+            </p:txBody>
+          </p:sp>
+        </mc:Choice>
+        <mc:Fallback xmlns="">
+          <p:sp>
+            <p:nvSpPr>
+              <p:cNvPr id="3" name="Content Placeholder 2"/>
+              <p:cNvSpPr>
+                <a:spLocks noGrp="1" noRot="1" noChangeAspect="1" noMove="1" noResize="1" noEditPoints="1" noAdjustHandles="1" noChangeArrowheads="1" noChangeShapeType="1" noTextEdit="1"/>
+              </p:cNvSpPr>
+              <p:nvPr>
+                <p:ph idx="1"/>
+              </p:nvPr>
+            </p:nvSpPr>
+            <p:spPr>
+              <a:blipFill>
+                <a:blip r:embed="rId3"/>
+                <a:stretch>
+                  <a:fillRect l="-1220" t="-2154" b="-410"/>
+                </a:stretch>
+              </a:blipFill>
+            </p:spPr>
+            <p:txBody>
+              <a:bodyPr/>
+              <a:lstStyle/>
+              <a:p>
+                <a:r>
+                  <a:rPr lang="en-US">
+                    <a:noFill/>
+                  </a:rPr>
+                  <a:t> </a:t>
+                </a:r>
+              </a:p>
+            </p:txBody>
+          </p:sp>
+        </mc:Fallback>
+      </mc:AlternateContent>
+    </p:spTree>
+    <p:extLst>
+      <p:ext uri="{BB962C8B-B14F-4D97-AF65-F5344CB8AC3E}">
+        <p14:creationId xmlns:p14="http://schemas.microsoft.com/office/powerpoint/2010/main" val="1109516032"/>
+      </p:ext>
+    </p:extLst>
+  </p:cSld>
+  <p:clrMapOvr>
+    <a:masterClrMapping/>
+  </p:clrMapOvr>
+</p:sld>
+</file>
+
+<file path=ppt/slides/slide16.xml><?xml version="1.0" encoding="utf-8"?>
+<p:sld xmlns:a="http://schemas.openxmlformats.org/drawingml/2006/main" xmlns:r="http://schemas.openxmlformats.org/officeDocument/2006/relationships" xmlns:p="http://schemas.openxmlformats.org/presentationml/2006/main">
+  <p:cSld>
+    <p:spTree>
+      <p:nvGrpSpPr>
+        <p:cNvPr id="1" name=""/>
+        <p:cNvGrpSpPr/>
+        <p:nvPr/>
+      </p:nvGrpSpPr>
+      <p:grpSpPr>
+        <a:xfrm>
+          <a:off x="0" y="0"/>
+          <a:ext cx="0" cy="0"/>
+          <a:chOff x="0" y="0"/>
+          <a:chExt cx="0" cy="0"/>
+        </a:xfrm>
+      </p:grpSpPr>
+      <p:sp>
+        <p:nvSpPr>
+          <p:cNvPr id="2" name="Title 1"/>
+          <p:cNvSpPr>
+            <a:spLocks noGrp="1"/>
+          </p:cNvSpPr>
+          <p:nvPr>
+            <p:ph type="title"/>
+          </p:nvPr>
+        </p:nvSpPr>
+        <p:spPr/>
+        <p:txBody>
+          <a:bodyPr/>
+          <a:lstStyle/>
+          <a:p>
+            <a:r>
+              <a:rPr lang="en-US" dirty="0"/>
               <a:t>Multivariate models</a:t>
             </a:r>
           </a:p>
@@ -7548,1026 +8568,6 @@
 </p:sld>
 </file>
 
-<file path=ppt/slides/slide15.xml><?xml version="1.0" encoding="utf-8"?>
-<p:sld xmlns:a="http://schemas.openxmlformats.org/drawingml/2006/main" xmlns:r="http://schemas.openxmlformats.org/officeDocument/2006/relationships" xmlns:p="http://schemas.openxmlformats.org/presentationml/2006/main">
-  <p:cSld>
-    <p:spTree>
-      <p:nvGrpSpPr>
-        <p:cNvPr id="1" name=""/>
-        <p:cNvGrpSpPr/>
-        <p:nvPr/>
-      </p:nvGrpSpPr>
-      <p:grpSpPr>
-        <a:xfrm>
-          <a:off x="0" y="0"/>
-          <a:ext cx="0" cy="0"/>
-          <a:chOff x="0" y="0"/>
-          <a:chExt cx="0" cy="0"/>
-        </a:xfrm>
-      </p:grpSpPr>
-      <p:sp>
-        <p:nvSpPr>
-          <p:cNvPr id="2" name="Title 1"/>
-          <p:cNvSpPr>
-            <a:spLocks noGrp="1"/>
-          </p:cNvSpPr>
-          <p:nvPr>
-            <p:ph type="title"/>
-          </p:nvPr>
-        </p:nvSpPr>
-        <p:spPr/>
-        <p:txBody>
-          <a:bodyPr/>
-          <a:lstStyle/>
-          <a:p>
-            <a:r>
-              <a:rPr lang="en-US" dirty="0"/>
-              <a:t>Community distribution models</a:t>
-            </a:r>
-          </a:p>
-        </p:txBody>
-      </p:sp>
-      <mc:AlternateContent xmlns:mc="http://schemas.openxmlformats.org/markup-compatibility/2006">
-        <mc:Choice xmlns:a14="http://schemas.microsoft.com/office/drawing/2010/main" Requires="a14">
-          <p:sp>
-            <p:nvSpPr>
-              <p:cNvPr id="3" name="Content Placeholder 2"/>
-              <p:cNvSpPr>
-                <a:spLocks noGrp="1"/>
-              </p:cNvSpPr>
-              <p:nvPr>
-                <p:ph idx="1"/>
-              </p:nvPr>
-            </p:nvSpPr>
-            <p:spPr/>
-            <p:txBody>
-              <a:bodyPr>
-                <a:normAutofit lnSpcReduction="10000"/>
-              </a:bodyPr>
-              <a:lstStyle/>
-              <a:p>
-                <a:pPr marL="0" indent="0">
-                  <a:buNone/>
-                </a:pPr>
-                <a:r>
-                  <a:rPr lang="en-US" dirty="0"/>
-                  <a:t>Univariate random variable:</a:t>
-                </a:r>
-              </a:p>
-              <a:p>
-                <a:r>
-                  <a:rPr lang="en-US" dirty="0"/>
-                  <a:t>If</a:t>
-                </a:r>
-              </a:p>
-              <a:p>
-                <a:pPr marL="0" indent="0">
-                  <a:buNone/>
-                </a:pPr>
-                <a14:m>
-                  <m:oMathPara xmlns:m="http://schemas.openxmlformats.org/officeDocument/2006/math">
-                    <m:oMathParaPr>
-                      <m:jc m:val="centerGroup"/>
-                    </m:oMathParaPr>
-                    <m:oMath xmlns:m="http://schemas.openxmlformats.org/officeDocument/2006/math">
-                      <m:r>
-                        <m:rPr>
-                          <m:sty m:val="p"/>
-                        </m:rPr>
-                        <a:rPr lang="en-US" b="0" i="0" smtClean="0">
-                          <a:latin typeface="Cambria Math" panose="02040503050406030204" pitchFamily="18" charset="0"/>
-                        </a:rPr>
-                        <m:t>A</m:t>
-                      </m:r>
-                      <m:r>
-                        <a:rPr lang="en-US" b="0" i="1" smtClean="0">
-                          <a:latin typeface="Cambria Math" panose="02040503050406030204" pitchFamily="18" charset="0"/>
-                        </a:rPr>
-                        <m:t>~</m:t>
-                      </m:r>
-                      <m:r>
-                        <a:rPr lang="en-US" b="0" i="1" smtClean="0">
-                          <a:latin typeface="Cambria Math" panose="02040503050406030204" pitchFamily="18" charset="0"/>
-                        </a:rPr>
-                        <m:t>𝑁𝑜𝑟𝑚𝑎𝑙</m:t>
-                      </m:r>
-                      <m:r>
-                        <a:rPr lang="en-US" b="0" i="1" smtClean="0">
-                          <a:latin typeface="Cambria Math" panose="02040503050406030204" pitchFamily="18" charset="0"/>
-                        </a:rPr>
-                        <m:t>(0,</m:t>
-                      </m:r>
-                      <m:sSup>
-                        <m:sSupPr>
-                          <m:ctrlPr>
-                            <a:rPr lang="en-US" b="0" i="1" smtClean="0">
-                              <a:latin typeface="Cambria Math" panose="02040503050406030204" pitchFamily="18" charset="0"/>
-                            </a:rPr>
-                          </m:ctrlPr>
-                        </m:sSupPr>
-                        <m:e>
-                          <m:r>
-                            <a:rPr lang="en-US" b="0" i="1" smtClean="0">
-                              <a:latin typeface="Cambria Math" panose="02040503050406030204" pitchFamily="18" charset="0"/>
-                            </a:rPr>
-                            <m:t>𝜎</m:t>
-                          </m:r>
-                        </m:e>
-                        <m:sup>
-                          <m:r>
-                            <a:rPr lang="en-US" b="0" i="1" smtClean="0">
-                              <a:latin typeface="Cambria Math" panose="02040503050406030204" pitchFamily="18" charset="0"/>
-                            </a:rPr>
-                            <m:t>2</m:t>
-                          </m:r>
-                        </m:sup>
-                      </m:sSup>
-                      <m:r>
-                        <a:rPr lang="en-US" b="0" i="1" smtClean="0">
-                          <a:latin typeface="Cambria Math" panose="02040503050406030204" pitchFamily="18" charset="0"/>
-                        </a:rPr>
-                        <m:t>)</m:t>
-                      </m:r>
-                    </m:oMath>
-                  </m:oMathPara>
-                </a14:m>
-                <a:endParaRPr lang="en-US" dirty="0"/>
-              </a:p>
-              <a:p>
-                <a:r>
-                  <a:rPr lang="en-US" dirty="0"/>
-                  <a:t>Then</a:t>
-                </a:r>
-              </a:p>
-              <a:p>
-                <a:pPr marL="0" indent="0">
-                  <a:buNone/>
-                </a:pPr>
-                <a14:m>
-                  <m:oMathPara xmlns:m="http://schemas.openxmlformats.org/officeDocument/2006/math">
-                    <m:oMathParaPr>
-                      <m:jc m:val="centerGroup"/>
-                    </m:oMathParaPr>
-                    <m:oMath xmlns:m="http://schemas.openxmlformats.org/officeDocument/2006/math">
-                      <m:r>
-                        <m:rPr>
-                          <m:sty m:val="p"/>
-                        </m:rPr>
-                        <a:rPr lang="en-US" b="0" i="0" smtClean="0">
-                          <a:latin typeface="Cambria Math" panose="02040503050406030204" pitchFamily="18" charset="0"/>
-                        </a:rPr>
-                        <m:t>Var</m:t>
-                      </m:r>
-                      <m:d>
-                        <m:dPr>
-                          <m:ctrlPr>
-                            <a:rPr lang="en-US" b="0" i="1" smtClean="0">
-                              <a:latin typeface="Cambria Math" panose="02040503050406030204" pitchFamily="18" charset="0"/>
-                            </a:rPr>
-                          </m:ctrlPr>
-                        </m:dPr>
-                        <m:e>
-                          <m:r>
-                            <a:rPr lang="en-US" b="0" i="1" smtClean="0">
-                              <a:latin typeface="Cambria Math" panose="02040503050406030204" pitchFamily="18" charset="0"/>
-                            </a:rPr>
-                            <m:t>𝑐</m:t>
-                          </m:r>
-                          <m:r>
-                            <m:rPr>
-                              <m:sty m:val="p"/>
-                            </m:rPr>
-                            <a:rPr lang="en-US" b="0" i="0" smtClean="0">
-                              <a:latin typeface="Cambria Math" panose="02040503050406030204" pitchFamily="18" charset="0"/>
-                            </a:rPr>
-                            <m:t>A</m:t>
-                          </m:r>
-                        </m:e>
-                      </m:d>
-                      <m:r>
-                        <a:rPr lang="en-US" b="0" i="1" smtClean="0">
-                          <a:latin typeface="Cambria Math" panose="02040503050406030204" pitchFamily="18" charset="0"/>
-                        </a:rPr>
-                        <m:t>=</m:t>
-                      </m:r>
-                      <m:sSup>
-                        <m:sSupPr>
-                          <m:ctrlPr>
-                            <a:rPr lang="en-US" b="0" i="1" smtClean="0">
-                              <a:latin typeface="Cambria Math" panose="02040503050406030204" pitchFamily="18" charset="0"/>
-                            </a:rPr>
-                          </m:ctrlPr>
-                        </m:sSupPr>
-                        <m:e>
-                          <m:r>
-                            <a:rPr lang="en-US" b="0" i="1" smtClean="0">
-                              <a:latin typeface="Cambria Math" panose="02040503050406030204" pitchFamily="18" charset="0"/>
-                            </a:rPr>
-                            <m:t>𝑐</m:t>
-                          </m:r>
-                        </m:e>
-                        <m:sup>
-                          <m:r>
-                            <a:rPr lang="en-US" b="0" i="1" smtClean="0">
-                              <a:latin typeface="Cambria Math" panose="02040503050406030204" pitchFamily="18" charset="0"/>
-                            </a:rPr>
-                            <m:t>2</m:t>
-                          </m:r>
-                        </m:sup>
-                      </m:sSup>
-                      <m:sSup>
-                        <m:sSupPr>
-                          <m:ctrlPr>
-                            <a:rPr lang="en-US" b="0" i="1" smtClean="0">
-                              <a:latin typeface="Cambria Math" panose="02040503050406030204" pitchFamily="18" charset="0"/>
-                            </a:rPr>
-                          </m:ctrlPr>
-                        </m:sSupPr>
-                        <m:e>
-                          <m:r>
-                            <a:rPr lang="en-US" b="0" i="1" smtClean="0">
-                              <a:latin typeface="Cambria Math" panose="02040503050406030204" pitchFamily="18" charset="0"/>
-                            </a:rPr>
-                            <m:t>𝜎</m:t>
-                          </m:r>
-                        </m:e>
-                        <m:sup>
-                          <m:r>
-                            <a:rPr lang="en-US" b="0" i="1" smtClean="0">
-                              <a:latin typeface="Cambria Math" panose="02040503050406030204" pitchFamily="18" charset="0"/>
-                            </a:rPr>
-                            <m:t>2</m:t>
-                          </m:r>
-                        </m:sup>
-                      </m:sSup>
-                    </m:oMath>
-                  </m:oMathPara>
-                </a14:m>
-                <a:endParaRPr lang="en-US" dirty="0"/>
-              </a:p>
-              <a:p>
-                <a:pPr marL="0" indent="0">
-                  <a:buNone/>
-                </a:pPr>
-                <a:endParaRPr lang="en-US" dirty="0"/>
-              </a:p>
-              <a:p>
-                <a:pPr marL="0" indent="0">
-                  <a:buNone/>
-                </a:pPr>
-                <a:r>
-                  <a:rPr lang="en-US" dirty="0"/>
-                  <a:t>Multivariate random variable</a:t>
-                </a:r>
-              </a:p>
-              <a:p>
-                <a:r>
-                  <a:rPr lang="en-US" dirty="0"/>
-                  <a:t>If </a:t>
-                </a:r>
-              </a:p>
-              <a:p>
-                <a:pPr marL="0" indent="0">
-                  <a:buNone/>
-                </a:pPr>
-                <a14:m>
-                  <m:oMathPara xmlns:m="http://schemas.openxmlformats.org/officeDocument/2006/math">
-                    <m:oMathParaPr>
-                      <m:jc m:val="centerGroup"/>
-                    </m:oMathParaPr>
-                    <m:oMath xmlns:m="http://schemas.openxmlformats.org/officeDocument/2006/math">
-                      <m:r>
-                        <a:rPr lang="en-US" b="1">
-                          <a:latin typeface="Cambria Math" panose="02040503050406030204" pitchFamily="18" charset="0"/>
-                          <a:ea typeface="Cambria Math" panose="02040503050406030204" pitchFamily="18" charset="0"/>
-                        </a:rPr>
-                        <m:t>𝛆</m:t>
-                      </m:r>
-                      <m:r>
-                        <a:rPr lang="en-US" i="1">
-                          <a:latin typeface="Cambria Math" panose="02040503050406030204" pitchFamily="18" charset="0"/>
-                          <a:ea typeface="Cambria Math" panose="02040503050406030204" pitchFamily="18" charset="0"/>
-                        </a:rPr>
-                        <m:t>~</m:t>
-                      </m:r>
-                      <m:r>
-                        <a:rPr lang="en-US" i="1">
-                          <a:latin typeface="Cambria Math" panose="02040503050406030204" pitchFamily="18" charset="0"/>
-                          <a:ea typeface="Cambria Math" panose="02040503050406030204" pitchFamily="18" charset="0"/>
-                        </a:rPr>
-                        <m:t>𝑀𝑉𝑁</m:t>
-                      </m:r>
-                      <m:r>
-                        <a:rPr lang="en-US" i="1">
-                          <a:latin typeface="Cambria Math" panose="02040503050406030204" pitchFamily="18" charset="0"/>
-                          <a:ea typeface="Cambria Math" panose="02040503050406030204" pitchFamily="18" charset="0"/>
-                        </a:rPr>
-                        <m:t>(</m:t>
-                      </m:r>
-                      <m:r>
-                        <a:rPr lang="en-US" b="1" i="1">
-                          <a:latin typeface="Cambria Math" panose="02040503050406030204" pitchFamily="18" charset="0"/>
-                          <a:ea typeface="Cambria Math" panose="02040503050406030204" pitchFamily="18" charset="0"/>
-                        </a:rPr>
-                        <m:t>𝟎</m:t>
-                      </m:r>
-                      <m:r>
-                        <a:rPr lang="en-US" i="1">
-                          <a:latin typeface="Cambria Math" panose="02040503050406030204" pitchFamily="18" charset="0"/>
-                          <a:ea typeface="Cambria Math" panose="02040503050406030204" pitchFamily="18" charset="0"/>
-                        </a:rPr>
-                        <m:t>,</m:t>
-                      </m:r>
-                      <m:r>
-                        <a:rPr lang="el-GR" b="1">
-                          <a:latin typeface="Cambria Math" panose="02040503050406030204" pitchFamily="18" charset="0"/>
-                          <a:ea typeface="Cambria Math" panose="02040503050406030204" pitchFamily="18" charset="0"/>
-                        </a:rPr>
-                        <m:t>𝚺</m:t>
-                      </m:r>
-                      <m:r>
-                        <a:rPr lang="en-US" b="1">
-                          <a:latin typeface="Cambria Math" panose="02040503050406030204" pitchFamily="18" charset="0"/>
-                          <a:ea typeface="Cambria Math" panose="02040503050406030204" pitchFamily="18" charset="0"/>
-                        </a:rPr>
-                        <m:t>)</m:t>
-                      </m:r>
-                    </m:oMath>
-                  </m:oMathPara>
-                </a14:m>
-                <a:endParaRPr lang="en-US" dirty="0"/>
-              </a:p>
-              <a:p>
-                <a:r>
-                  <a:rPr lang="en-US" dirty="0"/>
-                  <a:t>Then</a:t>
-                </a:r>
-              </a:p>
-              <a:p>
-                <a:pPr marL="0" indent="0">
-                  <a:buNone/>
-                </a:pPr>
-                <a14:m>
-                  <m:oMathPara xmlns:m="http://schemas.openxmlformats.org/officeDocument/2006/math">
-                    <m:oMathParaPr>
-                      <m:jc m:val="centerGroup"/>
-                    </m:oMathParaPr>
-                    <m:oMath xmlns:m="http://schemas.openxmlformats.org/officeDocument/2006/math">
-                      <m:r>
-                        <m:rPr>
-                          <m:sty m:val="p"/>
-                        </m:rPr>
-                        <a:rPr lang="en-US" b="0" i="0" smtClean="0">
-                          <a:latin typeface="Cambria Math" panose="02040503050406030204" pitchFamily="18" charset="0"/>
-                        </a:rPr>
-                        <m:t>Var</m:t>
-                      </m:r>
-                      <m:d>
-                        <m:dPr>
-                          <m:ctrlPr>
-                            <a:rPr lang="en-US" b="0" i="1" smtClean="0">
-                              <a:latin typeface="Cambria Math" panose="02040503050406030204" pitchFamily="18" charset="0"/>
-                            </a:rPr>
-                          </m:ctrlPr>
-                        </m:dPr>
-                        <m:e>
-                          <m:r>
-                            <a:rPr lang="en-US" b="1" i="0" smtClean="0">
-                              <a:latin typeface="Cambria Math" panose="02040503050406030204" pitchFamily="18" charset="0"/>
-                            </a:rPr>
-                            <m:t>𝐋</m:t>
-                          </m:r>
-                          <m:r>
-                            <a:rPr lang="en-US" b="1" i="0" smtClean="0">
-                              <a:latin typeface="Cambria Math" panose="02040503050406030204" pitchFamily="18" charset="0"/>
-                            </a:rPr>
-                            <m:t>𝛜</m:t>
-                          </m:r>
-                        </m:e>
-                      </m:d>
-                      <m:r>
-                        <a:rPr lang="en-US" b="0" i="1" smtClean="0">
-                          <a:latin typeface="Cambria Math" panose="02040503050406030204" pitchFamily="18" charset="0"/>
-                        </a:rPr>
-                        <m:t>=</m:t>
-                      </m:r>
-                      <m:r>
-                        <a:rPr lang="en-US" b="1">
-                          <a:latin typeface="Cambria Math" panose="02040503050406030204" pitchFamily="18" charset="0"/>
-                        </a:rPr>
-                        <m:t>𝐋</m:t>
-                      </m:r>
-                      <m:r>
-                        <a:rPr lang="el-GR" b="1">
-                          <a:latin typeface="Cambria Math" panose="02040503050406030204" pitchFamily="18" charset="0"/>
-                          <a:ea typeface="Cambria Math" panose="02040503050406030204" pitchFamily="18" charset="0"/>
-                        </a:rPr>
-                        <m:t>𝚺</m:t>
-                      </m:r>
-                      <m:sSup>
-                        <m:sSupPr>
-                          <m:ctrlPr>
-                            <a:rPr lang="en-US" b="1" i="1" smtClean="0">
-                              <a:latin typeface="Cambria Math" panose="02040503050406030204" pitchFamily="18" charset="0"/>
-                              <a:ea typeface="Cambria Math" panose="02040503050406030204" pitchFamily="18" charset="0"/>
-                            </a:rPr>
-                          </m:ctrlPr>
-                        </m:sSupPr>
-                        <m:e>
-                          <m:r>
-                            <a:rPr lang="en-US" b="1">
-                              <a:latin typeface="Cambria Math" panose="02040503050406030204" pitchFamily="18" charset="0"/>
-                            </a:rPr>
-                            <m:t>𝐋</m:t>
-                          </m:r>
-                        </m:e>
-                        <m:sup>
-                          <m:r>
-                            <a:rPr lang="en-US" b="0" i="1" smtClean="0">
-                              <a:latin typeface="Cambria Math" panose="02040503050406030204" pitchFamily="18" charset="0"/>
-                            </a:rPr>
-                            <m:t>𝑡</m:t>
-                          </m:r>
-                        </m:sup>
-                      </m:sSup>
-                    </m:oMath>
-                  </m:oMathPara>
-                </a14:m>
-                <a:endParaRPr lang="en-US" dirty="0"/>
-              </a:p>
-              <a:p>
-                <a:pPr marL="0" indent="0">
-                  <a:buNone/>
-                </a:pPr>
-                <a:endParaRPr lang="en-US" dirty="0"/>
-              </a:p>
-              <a:p>
-                <a:pPr marL="0" indent="0">
-                  <a:buNone/>
-                </a:pPr>
-                <a:endParaRPr lang="en-US" dirty="0"/>
-              </a:p>
-            </p:txBody>
-          </p:sp>
-        </mc:Choice>
-        <mc:Fallback>
-          <p:sp>
-            <p:nvSpPr>
-              <p:cNvPr id="3" name="Content Placeholder 2"/>
-              <p:cNvSpPr>
-                <a:spLocks noGrp="1" noRot="1" noChangeAspect="1" noMove="1" noResize="1" noEditPoints="1" noAdjustHandles="1" noChangeArrowheads="1" noChangeShapeType="1" noTextEdit="1"/>
-              </p:cNvSpPr>
-              <p:nvPr>
-                <p:ph idx="1"/>
-              </p:nvPr>
-            </p:nvSpPr>
-            <p:spPr>
-              <a:blipFill>
-                <a:blip r:embed="rId3"/>
-                <a:stretch>
-                  <a:fillRect l="-1424" t="-1744"/>
-                </a:stretch>
-              </a:blipFill>
-            </p:spPr>
-            <p:txBody>
-              <a:bodyPr/>
-              <a:lstStyle/>
-              <a:p>
-                <a:r>
-                  <a:rPr lang="en-US">
-                    <a:noFill/>
-                  </a:rPr>
-                  <a:t> </a:t>
-                </a:r>
-              </a:p>
-            </p:txBody>
-          </p:sp>
-        </mc:Fallback>
-      </mc:AlternateContent>
-    </p:spTree>
-    <p:extLst>
-      <p:ext uri="{BB962C8B-B14F-4D97-AF65-F5344CB8AC3E}">
-        <p14:creationId xmlns:p14="http://schemas.microsoft.com/office/powerpoint/2010/main" val="360273833"/>
-      </p:ext>
-    </p:extLst>
-  </p:cSld>
-  <p:clrMapOvr>
-    <a:masterClrMapping/>
-  </p:clrMapOvr>
-</p:sld>
-</file>
-
-<file path=ppt/slides/slide16.xml><?xml version="1.0" encoding="utf-8"?>
-<p:sld xmlns:a="http://schemas.openxmlformats.org/drawingml/2006/main" xmlns:r="http://schemas.openxmlformats.org/officeDocument/2006/relationships" xmlns:p="http://schemas.openxmlformats.org/presentationml/2006/main">
-  <p:cSld>
-    <p:spTree>
-      <p:nvGrpSpPr>
-        <p:cNvPr id="1" name=""/>
-        <p:cNvGrpSpPr/>
-        <p:nvPr/>
-      </p:nvGrpSpPr>
-      <p:grpSpPr>
-        <a:xfrm>
-          <a:off x="0" y="0"/>
-          <a:ext cx="0" cy="0"/>
-          <a:chOff x="0" y="0"/>
-          <a:chExt cx="0" cy="0"/>
-        </a:xfrm>
-      </p:grpSpPr>
-      <p:sp>
-        <p:nvSpPr>
-          <p:cNvPr id="2" name="Title 1"/>
-          <p:cNvSpPr>
-            <a:spLocks noGrp="1"/>
-          </p:cNvSpPr>
-          <p:nvPr>
-            <p:ph type="title"/>
-          </p:nvPr>
-        </p:nvSpPr>
-        <p:spPr/>
-        <p:txBody>
-          <a:bodyPr/>
-          <a:lstStyle/>
-          <a:p>
-            <a:r>
-              <a:rPr lang="en-US" dirty="0"/>
-              <a:t>Community distribution models</a:t>
-            </a:r>
-          </a:p>
-        </p:txBody>
-      </p:sp>
-      <mc:AlternateContent xmlns:mc="http://schemas.openxmlformats.org/markup-compatibility/2006">
-        <mc:Choice xmlns:a14="http://schemas.microsoft.com/office/drawing/2010/main" Requires="a14">
-          <p:sp>
-            <p:nvSpPr>
-              <p:cNvPr id="3" name="Content Placeholder 2"/>
-              <p:cNvSpPr>
-                <a:spLocks noGrp="1"/>
-              </p:cNvSpPr>
-              <p:nvPr>
-                <p:ph idx="1"/>
-              </p:nvPr>
-            </p:nvSpPr>
-            <p:spPr/>
-            <p:txBody>
-              <a:bodyPr>
-                <a:normAutofit fontScale="92500" lnSpcReduction="20000"/>
-              </a:bodyPr>
-              <a:lstStyle/>
-              <a:p>
-                <a:pPr marL="0" indent="0">
-                  <a:buNone/>
-                </a:pPr>
-                <a:r>
-                  <a:rPr lang="en-US" dirty="0"/>
-                  <a:t>Multivariate random variable</a:t>
-                </a:r>
-              </a:p>
-              <a:p>
-                <a:r>
-                  <a:rPr lang="en-US" dirty="0"/>
-                  <a:t>If (simplifying previous version)</a:t>
-                </a:r>
-              </a:p>
-              <a:p>
-                <a:pPr marL="0" indent="0">
-                  <a:buNone/>
-                </a:pPr>
-                <a14:m>
-                  <m:oMathPara xmlns:m="http://schemas.openxmlformats.org/officeDocument/2006/math">
-                    <m:oMathParaPr>
-                      <m:jc m:val="centerGroup"/>
-                    </m:oMathParaPr>
-                    <m:oMath xmlns:m="http://schemas.openxmlformats.org/officeDocument/2006/math">
-                      <m:r>
-                        <a:rPr lang="en-US" b="1">
-                          <a:latin typeface="Cambria Math" panose="02040503050406030204" pitchFamily="18" charset="0"/>
-                          <a:ea typeface="Cambria Math" panose="02040503050406030204" pitchFamily="18" charset="0"/>
-                        </a:rPr>
-                        <m:t>𝛆</m:t>
-                      </m:r>
-                      <m:r>
-                        <a:rPr lang="en-US" i="1">
-                          <a:latin typeface="Cambria Math" panose="02040503050406030204" pitchFamily="18" charset="0"/>
-                          <a:ea typeface="Cambria Math" panose="02040503050406030204" pitchFamily="18" charset="0"/>
-                        </a:rPr>
-                        <m:t>~</m:t>
-                      </m:r>
-                      <m:r>
-                        <a:rPr lang="en-US" i="1">
-                          <a:latin typeface="Cambria Math" panose="02040503050406030204" pitchFamily="18" charset="0"/>
-                          <a:ea typeface="Cambria Math" panose="02040503050406030204" pitchFamily="18" charset="0"/>
-                        </a:rPr>
-                        <m:t>𝑀𝑉𝑁</m:t>
-                      </m:r>
-                      <m:r>
-                        <a:rPr lang="en-US" i="1">
-                          <a:latin typeface="Cambria Math" panose="02040503050406030204" pitchFamily="18" charset="0"/>
-                          <a:ea typeface="Cambria Math" panose="02040503050406030204" pitchFamily="18" charset="0"/>
-                        </a:rPr>
-                        <m:t>(</m:t>
-                      </m:r>
-                      <m:r>
-                        <a:rPr lang="en-US" b="1" i="1">
-                          <a:latin typeface="Cambria Math" panose="02040503050406030204" pitchFamily="18" charset="0"/>
-                          <a:ea typeface="Cambria Math" panose="02040503050406030204" pitchFamily="18" charset="0"/>
-                        </a:rPr>
-                        <m:t>𝟎</m:t>
-                      </m:r>
-                      <m:r>
-                        <a:rPr lang="en-US" i="1">
-                          <a:latin typeface="Cambria Math" panose="02040503050406030204" pitchFamily="18" charset="0"/>
-                          <a:ea typeface="Cambria Math" panose="02040503050406030204" pitchFamily="18" charset="0"/>
-                        </a:rPr>
-                        <m:t>,</m:t>
-                      </m:r>
-                      <m:r>
-                        <a:rPr lang="en-US" b="1" i="0" smtClean="0">
-                          <a:latin typeface="Cambria Math" panose="02040503050406030204" pitchFamily="18" charset="0"/>
-                          <a:ea typeface="Cambria Math" panose="02040503050406030204" pitchFamily="18" charset="0"/>
-                        </a:rPr>
-                        <m:t>𝐈</m:t>
-                      </m:r>
-                      <m:r>
-                        <a:rPr lang="en-US" b="1">
-                          <a:latin typeface="Cambria Math" panose="02040503050406030204" pitchFamily="18" charset="0"/>
-                          <a:ea typeface="Cambria Math" panose="02040503050406030204" pitchFamily="18" charset="0"/>
-                        </a:rPr>
-                        <m:t>)</m:t>
-                      </m:r>
-                    </m:oMath>
-                  </m:oMathPara>
-                </a14:m>
-                <a:endParaRPr lang="en-US" dirty="0"/>
-              </a:p>
-              <a:p>
-                <a:r>
-                  <a:rPr lang="en-US" dirty="0"/>
-                  <a:t>Then</a:t>
-                </a:r>
-              </a:p>
-              <a:p>
-                <a:pPr marL="0" indent="0">
-                  <a:buNone/>
-                </a:pPr>
-                <a14:m>
-                  <m:oMathPara xmlns:m="http://schemas.openxmlformats.org/officeDocument/2006/math">
-                    <m:oMathParaPr>
-                      <m:jc m:val="centerGroup"/>
-                    </m:oMathParaPr>
-                    <m:oMath xmlns:m="http://schemas.openxmlformats.org/officeDocument/2006/math">
-                      <m:r>
-                        <m:rPr>
-                          <m:sty m:val="p"/>
-                        </m:rPr>
-                        <a:rPr lang="en-US" b="0" i="0" smtClean="0">
-                          <a:latin typeface="Cambria Math" panose="02040503050406030204" pitchFamily="18" charset="0"/>
-                        </a:rPr>
-                        <m:t>Var</m:t>
-                      </m:r>
-                      <m:d>
-                        <m:dPr>
-                          <m:ctrlPr>
-                            <a:rPr lang="en-US" b="0" i="1" smtClean="0">
-                              <a:latin typeface="Cambria Math" panose="02040503050406030204" pitchFamily="18" charset="0"/>
-                            </a:rPr>
-                          </m:ctrlPr>
-                        </m:dPr>
-                        <m:e>
-                          <m:r>
-                            <a:rPr lang="en-US" b="1" i="0" smtClean="0">
-                              <a:latin typeface="Cambria Math" panose="02040503050406030204" pitchFamily="18" charset="0"/>
-                            </a:rPr>
-                            <m:t>𝐋</m:t>
-                          </m:r>
-                          <m:r>
-                            <a:rPr lang="en-US" b="1" i="0" smtClean="0">
-                              <a:latin typeface="Cambria Math" panose="02040503050406030204" pitchFamily="18" charset="0"/>
-                            </a:rPr>
-                            <m:t>𝛜</m:t>
-                          </m:r>
-                        </m:e>
-                      </m:d>
-                      <m:r>
-                        <a:rPr lang="en-US" b="0" i="1" smtClean="0">
-                          <a:latin typeface="Cambria Math" panose="02040503050406030204" pitchFamily="18" charset="0"/>
-                        </a:rPr>
-                        <m:t>=</m:t>
-                      </m:r>
-                      <m:r>
-                        <a:rPr lang="en-US" b="1">
-                          <a:latin typeface="Cambria Math" panose="02040503050406030204" pitchFamily="18" charset="0"/>
-                        </a:rPr>
-                        <m:t>𝐋</m:t>
-                      </m:r>
-                      <m:sSup>
-                        <m:sSupPr>
-                          <m:ctrlPr>
-                            <a:rPr lang="en-US" b="1" i="1" smtClean="0">
-                              <a:latin typeface="Cambria Math" panose="02040503050406030204" pitchFamily="18" charset="0"/>
-                              <a:ea typeface="Cambria Math" panose="02040503050406030204" pitchFamily="18" charset="0"/>
-                            </a:rPr>
-                          </m:ctrlPr>
-                        </m:sSupPr>
-                        <m:e>
-                          <m:r>
-                            <a:rPr lang="en-US" b="1">
-                              <a:latin typeface="Cambria Math" panose="02040503050406030204" pitchFamily="18" charset="0"/>
-                            </a:rPr>
-                            <m:t>𝐋</m:t>
-                          </m:r>
-                        </m:e>
-                        <m:sup>
-                          <m:r>
-                            <a:rPr lang="en-US" b="0" i="1" smtClean="0">
-                              <a:latin typeface="Cambria Math" panose="02040503050406030204" pitchFamily="18" charset="0"/>
-                            </a:rPr>
-                            <m:t>𝑡</m:t>
-                          </m:r>
-                        </m:sup>
-                      </m:sSup>
-                    </m:oMath>
-                  </m:oMathPara>
-                </a14:m>
-                <a:endParaRPr lang="en-US" dirty="0"/>
-              </a:p>
-              <a:p>
-                <a:pPr marL="0" indent="0">
-                  <a:buNone/>
-                </a:pPr>
-                <a:endParaRPr lang="en-US" dirty="0"/>
-              </a:p>
-              <a:p>
-                <a:pPr marL="0" indent="0">
-                  <a:buNone/>
-                </a:pPr>
-                <a:r>
-                  <a:rPr lang="en-US" dirty="0"/>
-                  <a:t>So how can we simulate from a random normal distribution?</a:t>
-                </a:r>
-                <a:endParaRPr lang="en-US" b="1" dirty="0"/>
-              </a:p>
-              <a:p>
-                <a:r>
-                  <a:rPr lang="en-US" dirty="0"/>
-                  <a:t>Given </a:t>
-                </a:r>
-                <a:endParaRPr lang="en-US" b="1" i="0" dirty="0">
-                  <a:latin typeface="Cambria Math" panose="02040503050406030204" pitchFamily="18" charset="0"/>
-                  <a:ea typeface="Cambria Math" panose="02040503050406030204" pitchFamily="18" charset="0"/>
-                </a:endParaRPr>
-              </a:p>
-              <a:p>
-                <a:pPr marL="0" indent="0">
-                  <a:buNone/>
-                </a:pPr>
-                <a14:m>
-                  <m:oMathPara xmlns:m="http://schemas.openxmlformats.org/officeDocument/2006/math">
-                    <m:oMathParaPr>
-                      <m:jc m:val="centerGroup"/>
-                    </m:oMathParaPr>
-                    <m:oMath xmlns:m="http://schemas.openxmlformats.org/officeDocument/2006/math">
-                      <m:r>
-                        <a:rPr lang="en-US" b="1" i="0" smtClean="0">
-                          <a:latin typeface="Cambria Math" panose="02040503050406030204" pitchFamily="18" charset="0"/>
-                          <a:ea typeface="Cambria Math" panose="02040503050406030204" pitchFamily="18" charset="0"/>
-                        </a:rPr>
-                        <m:t>𝛆</m:t>
-                      </m:r>
-                      <m:r>
-                        <a:rPr lang="en-US" b="0" i="1" smtClean="0">
-                          <a:latin typeface="Cambria Math" panose="02040503050406030204" pitchFamily="18" charset="0"/>
-                          <a:ea typeface="Cambria Math" panose="02040503050406030204" pitchFamily="18" charset="0"/>
-                        </a:rPr>
-                        <m:t>~</m:t>
-                      </m:r>
-                      <m:r>
-                        <a:rPr lang="en-US" b="0" i="1" smtClean="0">
-                          <a:latin typeface="Cambria Math" panose="02040503050406030204" pitchFamily="18" charset="0"/>
-                          <a:ea typeface="Cambria Math" panose="02040503050406030204" pitchFamily="18" charset="0"/>
-                        </a:rPr>
-                        <m:t>𝑀𝑉𝑁</m:t>
-                      </m:r>
-                      <m:r>
-                        <a:rPr lang="en-US" b="0" i="1" smtClean="0">
-                          <a:latin typeface="Cambria Math" panose="02040503050406030204" pitchFamily="18" charset="0"/>
-                          <a:ea typeface="Cambria Math" panose="02040503050406030204" pitchFamily="18" charset="0"/>
-                        </a:rPr>
-                        <m:t>(</m:t>
-                      </m:r>
-                      <m:r>
-                        <a:rPr lang="en-US" b="1" i="1" smtClean="0">
-                          <a:latin typeface="Cambria Math" panose="02040503050406030204" pitchFamily="18" charset="0"/>
-                          <a:ea typeface="Cambria Math" panose="02040503050406030204" pitchFamily="18" charset="0"/>
-                        </a:rPr>
-                        <m:t>𝟎</m:t>
-                      </m:r>
-                      <m:r>
-                        <a:rPr lang="en-US" b="0" i="1" smtClean="0">
-                          <a:latin typeface="Cambria Math" panose="02040503050406030204" pitchFamily="18" charset="0"/>
-                          <a:ea typeface="Cambria Math" panose="02040503050406030204" pitchFamily="18" charset="0"/>
-                        </a:rPr>
-                        <m:t>,</m:t>
-                      </m:r>
-                      <m:r>
-                        <a:rPr lang="el-GR" b="1">
-                          <a:latin typeface="Cambria Math" panose="02040503050406030204" pitchFamily="18" charset="0"/>
-                          <a:ea typeface="Cambria Math" panose="02040503050406030204" pitchFamily="18" charset="0"/>
-                        </a:rPr>
-                        <m:t>𝚺</m:t>
-                      </m:r>
-                      <m:r>
-                        <a:rPr lang="en-US" b="1" i="0" smtClean="0">
-                          <a:latin typeface="Cambria Math" panose="02040503050406030204" pitchFamily="18" charset="0"/>
-                          <a:ea typeface="Cambria Math" panose="02040503050406030204" pitchFamily="18" charset="0"/>
-                        </a:rPr>
-                        <m:t>)</m:t>
-                      </m:r>
-                    </m:oMath>
-                  </m:oMathPara>
-                </a14:m>
-                <a:endParaRPr lang="en-US" dirty="0"/>
-              </a:p>
-              <a:p>
-                <a:pPr lvl="1"/>
-                <a:r>
-                  <a:rPr lang="en-US" dirty="0"/>
-                  <a:t>Then doing some math</a:t>
-                </a:r>
-              </a:p>
-              <a:p>
-                <a:pPr marL="457200" lvl="1" indent="0">
-                  <a:buNone/>
-                </a:pPr>
-                <a14:m>
-                  <m:oMathPara xmlns:m="http://schemas.openxmlformats.org/officeDocument/2006/math">
-                    <m:oMathParaPr>
-                      <m:jc m:val="centerGroup"/>
-                    </m:oMathParaPr>
-                    <m:oMath xmlns:m="http://schemas.openxmlformats.org/officeDocument/2006/math">
-                      <m:r>
-                        <a:rPr lang="en-US" b="1" i="0" smtClean="0">
-                          <a:latin typeface="Cambria Math" panose="02040503050406030204" pitchFamily="18" charset="0"/>
-                          <a:ea typeface="Cambria Math" panose="02040503050406030204" pitchFamily="18" charset="0"/>
-                        </a:rPr>
-                        <m:t>𝛅</m:t>
-                      </m:r>
-                      <m:r>
-                        <a:rPr lang="en-US" i="1">
-                          <a:latin typeface="Cambria Math" panose="02040503050406030204" pitchFamily="18" charset="0"/>
-                          <a:ea typeface="Cambria Math" panose="02040503050406030204" pitchFamily="18" charset="0"/>
-                        </a:rPr>
-                        <m:t>~</m:t>
-                      </m:r>
-                      <m:r>
-                        <a:rPr lang="en-US" i="1">
-                          <a:latin typeface="Cambria Math" panose="02040503050406030204" pitchFamily="18" charset="0"/>
-                          <a:ea typeface="Cambria Math" panose="02040503050406030204" pitchFamily="18" charset="0"/>
-                        </a:rPr>
-                        <m:t>𝑀𝑉𝑁</m:t>
-                      </m:r>
-                      <m:r>
-                        <a:rPr lang="en-US" i="1">
-                          <a:latin typeface="Cambria Math" panose="02040503050406030204" pitchFamily="18" charset="0"/>
-                          <a:ea typeface="Cambria Math" panose="02040503050406030204" pitchFamily="18" charset="0"/>
-                        </a:rPr>
-                        <m:t>(</m:t>
-                      </m:r>
-                      <m:r>
-                        <a:rPr lang="en-US" b="1" i="1">
-                          <a:latin typeface="Cambria Math" panose="02040503050406030204" pitchFamily="18" charset="0"/>
-                          <a:ea typeface="Cambria Math" panose="02040503050406030204" pitchFamily="18" charset="0"/>
-                        </a:rPr>
-                        <m:t>𝟎</m:t>
-                      </m:r>
-                      <m:r>
-                        <a:rPr lang="en-US" i="1">
-                          <a:latin typeface="Cambria Math" panose="02040503050406030204" pitchFamily="18" charset="0"/>
-                          <a:ea typeface="Cambria Math" panose="02040503050406030204" pitchFamily="18" charset="0"/>
-                        </a:rPr>
-                        <m:t>,</m:t>
-                      </m:r>
-                      <m:r>
-                        <a:rPr lang="en-US" b="1" i="0" smtClean="0">
-                          <a:latin typeface="Cambria Math" panose="02040503050406030204" pitchFamily="18" charset="0"/>
-                          <a:ea typeface="Cambria Math" panose="02040503050406030204" pitchFamily="18" charset="0"/>
-                        </a:rPr>
-                        <m:t>𝐈</m:t>
-                      </m:r>
-                      <m:r>
-                        <a:rPr lang="en-US" b="1">
-                          <a:latin typeface="Cambria Math" panose="02040503050406030204" pitchFamily="18" charset="0"/>
-                          <a:ea typeface="Cambria Math" panose="02040503050406030204" pitchFamily="18" charset="0"/>
-                        </a:rPr>
-                        <m:t>)</m:t>
-                      </m:r>
-                    </m:oMath>
-                  </m:oMathPara>
-                </a14:m>
-                <a:endParaRPr lang="en-US" dirty="0"/>
-              </a:p>
-              <a:p>
-                <a:pPr marL="457200" lvl="1" indent="0">
-                  <a:buNone/>
-                </a:pPr>
-                <a14:m>
-                  <m:oMathPara xmlns:m="http://schemas.openxmlformats.org/officeDocument/2006/math">
-                    <m:oMathParaPr>
-                      <m:jc m:val="centerGroup"/>
-                    </m:oMathParaPr>
-                    <m:oMath xmlns:m="http://schemas.openxmlformats.org/officeDocument/2006/math">
-                      <m:r>
-                        <a:rPr lang="en-US" b="1">
-                          <a:latin typeface="Cambria Math" panose="02040503050406030204" pitchFamily="18" charset="0"/>
-                          <a:ea typeface="Cambria Math" panose="02040503050406030204" pitchFamily="18" charset="0"/>
-                        </a:rPr>
-                        <m:t>𝛆</m:t>
-                      </m:r>
-                      <m:r>
-                        <a:rPr lang="en-US" b="1" i="0" smtClean="0">
-                          <a:latin typeface="Cambria Math" panose="02040503050406030204" pitchFamily="18" charset="0"/>
-                          <a:ea typeface="Cambria Math" panose="02040503050406030204" pitchFamily="18" charset="0"/>
-                        </a:rPr>
-                        <m:t>=</m:t>
-                      </m:r>
-                      <m:r>
-                        <a:rPr lang="en-US" b="1" i="0" smtClean="0">
-                          <a:latin typeface="Cambria Math" panose="02040503050406030204" pitchFamily="18" charset="0"/>
-                          <a:ea typeface="Cambria Math" panose="02040503050406030204" pitchFamily="18" charset="0"/>
-                        </a:rPr>
-                        <m:t>𝐋</m:t>
-                      </m:r>
-                      <m:r>
-                        <a:rPr lang="en-US" b="1">
-                          <a:latin typeface="Cambria Math" panose="02040503050406030204" pitchFamily="18" charset="0"/>
-                          <a:ea typeface="Cambria Math" panose="02040503050406030204" pitchFamily="18" charset="0"/>
-                        </a:rPr>
-                        <m:t>𝛅</m:t>
-                      </m:r>
-                    </m:oMath>
-                  </m:oMathPara>
-                </a14:m>
-                <a:endParaRPr lang="en-US" dirty="0"/>
-              </a:p>
-              <a:p>
-                <a:pPr marL="457200" lvl="1" indent="0">
-                  <a:buNone/>
-                </a:pPr>
-                <a:r>
-                  <a:rPr lang="en-US" dirty="0"/>
-                  <a:t>Why does this work?</a:t>
-                </a:r>
-              </a:p>
-            </p:txBody>
-          </p:sp>
-        </mc:Choice>
-        <mc:Fallback>
-          <p:sp>
-            <p:nvSpPr>
-              <p:cNvPr id="3" name="Content Placeholder 2"/>
-              <p:cNvSpPr>
-                <a:spLocks noGrp="1" noRot="1" noChangeAspect="1" noMove="1" noResize="1" noEditPoints="1" noAdjustHandles="1" noChangeArrowheads="1" noChangeShapeType="1" noTextEdit="1"/>
-              </p:cNvSpPr>
-              <p:nvPr>
-                <p:ph idx="1"/>
-              </p:nvPr>
-            </p:nvSpPr>
-            <p:spPr>
-              <a:blipFill>
-                <a:blip r:embed="rId3"/>
-                <a:stretch>
-                  <a:fillRect l="-1220" t="-2154" b="-410"/>
-                </a:stretch>
-              </a:blipFill>
-            </p:spPr>
-            <p:txBody>
-              <a:bodyPr/>
-              <a:lstStyle/>
-              <a:p>
-                <a:r>
-                  <a:rPr lang="en-US">
-                    <a:noFill/>
-                  </a:rPr>
-                  <a:t> </a:t>
-                </a:r>
-              </a:p>
-            </p:txBody>
-          </p:sp>
-        </mc:Fallback>
-      </mc:AlternateContent>
-    </p:spTree>
-    <p:extLst>
-      <p:ext uri="{BB962C8B-B14F-4D97-AF65-F5344CB8AC3E}">
-        <p14:creationId xmlns:p14="http://schemas.microsoft.com/office/powerpoint/2010/main" val="1109516032"/>
-      </p:ext>
-    </p:extLst>
-  </p:cSld>
-  <p:clrMapOvr>
-    <a:masterClrMapping/>
-  </p:clrMapOvr>
-</p:sld>
-</file>
-
 <file path=ppt/slides/slide17.xml><?xml version="1.0" encoding="utf-8"?>
 <p:sld xmlns:a="http://schemas.openxmlformats.org/drawingml/2006/main" xmlns:r="http://schemas.openxmlformats.org/officeDocument/2006/relationships" xmlns:p="http://schemas.openxmlformats.org/presentationml/2006/main">
   <p:cSld>
@@ -9288,8 +9288,8 @@
           </a:p>
         </p:txBody>
       </p:sp>
-      <mc:AlternateContent xmlns:mc="http://schemas.openxmlformats.org/markup-compatibility/2006">
-        <mc:Choice xmlns:a14="http://schemas.microsoft.com/office/drawing/2010/main" Requires="a14">
+      <mc:AlternateContent xmlns:mc="http://schemas.openxmlformats.org/markup-compatibility/2006" xmlns:a14="http://schemas.microsoft.com/office/drawing/2010/main">
+        <mc:Choice Requires="a14">
           <p:sp>
             <p:nvSpPr>
               <p:cNvPr id="3" name="Content Placeholder 2"/>
@@ -9835,7 +9835,7 @@
             </p:txBody>
           </p:sp>
         </mc:Choice>
-        <mc:Fallback>
+        <mc:Fallback xmlns="">
           <p:sp>
             <p:nvSpPr>
               <p:cNvPr id="3" name="Content Placeholder 2"/>
@@ -9952,8 +9952,8 @@
           </a:p>
         </p:txBody>
       </p:sp>
-      <mc:AlternateContent xmlns:mc="http://schemas.openxmlformats.org/markup-compatibility/2006">
-        <mc:Choice xmlns:a14="http://schemas.microsoft.com/office/drawing/2010/main" Requires="a14">
+      <mc:AlternateContent xmlns:mc="http://schemas.openxmlformats.org/markup-compatibility/2006" xmlns:a14="http://schemas.microsoft.com/office/drawing/2010/main">
+        <mc:Choice Requires="a14">
           <p:sp>
             <p:nvSpPr>
               <p:cNvPr id="3" name="Content Placeholder 2"/>
@@ -10824,7 +10824,7 @@
                       <m:d>
                         <m:dPr>
                           <m:ctrlPr>
-                            <a:rPr lang="en-US" b="0" i="0" smtClean="0">
+                            <a:rPr lang="en-US" b="0" i="1" smtClean="0">
                               <a:latin typeface="Cambria Math" panose="02040503050406030204" pitchFamily="18" charset="0"/>
                             </a:rPr>
                           </m:ctrlPr>
@@ -10927,7 +10927,7 @@
                       <m:sSub>
                         <m:sSubPr>
                           <m:ctrlPr>
-                            <a:rPr lang="en-US" b="0" i="0" smtClean="0">
+                            <a:rPr lang="en-US" b="0" i="1" smtClean="0">
                               <a:latin typeface="Cambria Math" panose="02040503050406030204" pitchFamily="18" charset="0"/>
                             </a:rPr>
                           </m:ctrlPr>
@@ -10958,7 +10958,7 @@
                       <m:sSup>
                         <m:sSupPr>
                           <m:ctrlPr>
-                            <a:rPr lang="en-US" b="0" i="0" smtClean="0">
+                            <a:rPr lang="en-US" b="0" i="1" smtClean="0">
                               <a:latin typeface="Cambria Math" panose="02040503050406030204" pitchFamily="18" charset="0"/>
                             </a:rPr>
                           </m:ctrlPr>
@@ -11003,7 +11003,7 @@
             </p:txBody>
           </p:sp>
         </mc:Choice>
-        <mc:Fallback>
+        <mc:Fallback xmlns="">
           <p:sp>
             <p:nvSpPr>
               <p:cNvPr id="3" name="Content Placeholder 2"/>
@@ -11230,7 +11230,9 @@
         </p:nvSpPr>
         <p:spPr/>
         <p:txBody>
-          <a:bodyPr/>
+          <a:bodyPr>
+            <a:normAutofit/>
+          </a:bodyPr>
           <a:lstStyle/>
           <a:p>
             <a:pPr marL="0" indent="0">
@@ -11238,7 +11240,7 @@
             </a:pPr>
             <a:r>
               <a:rPr lang="en-US" dirty="0"/>
-              <a:t>Approaches to model covariance:</a:t>
+              <a:t>Approaches to think about covariance:</a:t>
             </a:r>
           </a:p>
           <a:p>
@@ -11259,6 +11261,41 @@
             <a:r>
               <a:rPr lang="en-US" dirty="0"/>
               <a:t>Eigen-decomposition (“principal components analysis”)</a:t>
+            </a:r>
+          </a:p>
+          <a:p>
+            <a:pPr marL="0" indent="0">
+              <a:buNone/>
+            </a:pPr>
+            <a:endParaRPr lang="en-US" dirty="0"/>
+          </a:p>
+          <a:p>
+            <a:pPr marL="0" indent="0">
+              <a:buNone/>
+            </a:pPr>
+            <a:r>
+              <a:rPr lang="en-US" dirty="0"/>
+              <a:t>Elementary ways to specify variance</a:t>
+            </a:r>
+          </a:p>
+          <a:p>
+            <a:pPr marL="514350" indent="-514350">
+              <a:buFont typeface="+mj-lt"/>
+              <a:buAutoNum type="arabicPeriod"/>
+            </a:pPr>
+            <a:r>
+              <a:rPr lang="en-US" dirty="0"/>
+              <a:t>Diagonal and equal</a:t>
+            </a:r>
+          </a:p>
+          <a:p>
+            <a:pPr marL="514350" indent="-514350">
+              <a:buFont typeface="+mj-lt"/>
+              <a:buAutoNum type="arabicPeriod"/>
+            </a:pPr>
+            <a:r>
+              <a:rPr lang="en-US" dirty="0"/>
+              <a:t>Diagonal and unequal</a:t>
             </a:r>
           </a:p>
           <a:p>
@@ -11868,8 +11905,8 @@
           </a:p>
         </p:txBody>
       </p:sp>
-      <mc:AlternateContent xmlns:mc="http://schemas.openxmlformats.org/markup-compatibility/2006">
-        <mc:Choice xmlns:a14="http://schemas.microsoft.com/office/drawing/2010/main" Requires="a14">
+      <mc:AlternateContent xmlns:mc="http://schemas.openxmlformats.org/markup-compatibility/2006" xmlns:a14="http://schemas.microsoft.com/office/drawing/2010/main">
+        <mc:Choice Requires="a14">
           <p:sp>
             <p:nvSpPr>
               <p:cNvPr id="3" name="Content Placeholder 2"/>
@@ -12055,7 +12092,7 @@
             </p:txBody>
           </p:sp>
         </mc:Choice>
-        <mc:Fallback>
+        <mc:Fallback xmlns="">
           <p:sp>
             <p:nvSpPr>
               <p:cNvPr id="3" name="Content Placeholder 2"/>
@@ -12141,8 +12178,8 @@
           </a:p>
         </p:txBody>
       </p:sp>
-      <mc:AlternateContent xmlns:mc="http://schemas.openxmlformats.org/markup-compatibility/2006">
-        <mc:Choice xmlns:a14="http://schemas.microsoft.com/office/drawing/2010/main" Requires="a14">
+      <mc:AlternateContent xmlns:mc="http://schemas.openxmlformats.org/markup-compatibility/2006" xmlns:a14="http://schemas.microsoft.com/office/drawing/2010/main">
+        <mc:Choice Requires="a14">
           <p:sp>
             <p:nvSpPr>
               <p:cNvPr id="3" name="Content Placeholder 2"/>
@@ -12550,7 +12587,7 @@
             </p:txBody>
           </p:sp>
         </mc:Choice>
-        <mc:Fallback>
+        <mc:Fallback xmlns="">
           <p:sp>
             <p:nvSpPr>
               <p:cNvPr id="3" name="Content Placeholder 2"/>

</xml_diff>